<commit_message>
refactored Powerpoint table generator to use Datatable instead of a 2d array
</commit_message>
<xml_diff>
--- a/Outputs/Customers.pptx
+++ b/Outputs/Customers.pptx
@@ -3095,7 +3095,7 @@
         </p:nvGraphicFramePr>
         <p:xfrm>
           <a:off x="395605" y="549275"/>
-          <a:ext cx="8343265" cy="5584825"/>
+          <a:ext cx="7151370" cy="5584825"/>
         </p:xfrm>
         <a:graphic>
           <a:graphicData uri="http://schemas.openxmlformats.org/drawingml/2006/table">
@@ -3110,7 +3110,6 @@
                 <a:gridCol w="1191895"/>
                 <a:gridCol w="1191895"/>
                 <a:gridCol w="1191895"/>
-                <a:gridCol w="1191895"/>
               </a:tblGrid>
               <a:tr h="372745">
                 <a:tc>
@@ -3257,30 +3256,6 @@
                     </a:solidFill>
                   </a:tcPr>
                 </a:tc>
-                <a:tc>
-                  <a:txBody>
-                    <a:bodyPr vert="horz" wrap="square"/>
-                    <a:lstStyle/>
-                    <a:p>
-                      <a:pPr>
-                        <a:buNone/>
-                      </a:pPr>
-                      <a:r>
-                        <a:rPr lang="en-GB" sz="1200">
-                          <a:solidFill>
-                            <a:schemeClr val="bg1"/>
-                          </a:solidFill>
-                        </a:rPr>
-                        <a:t>Phone</a:t>
-                      </a:r>
-                    </a:p>
-                  </a:txBody>
-                  <a:tcPr>
-                    <a:solidFill>
-                      <a:srgbClr val="666666"/>
-                    </a:solidFill>
-                  </a:tcPr>
-                </a:tc>
               </a:tr>
               <a:tr h="381000">
                 <a:tc>
@@ -3439,32 +3414,6 @@
                     </a:solidFill>
                   </a:tcPr>
                 </a:tc>
-                <a:tc>
-                  <a:txBody>
-                    <a:bodyPr vert="horz" wrap="square"/>
-                    <a:lstStyle/>
-                    <a:p>
-                      <a:pPr>
-                        <a:buNone/>
-                      </a:pPr>
-                      <a:r>
-                        <a:rPr lang="en-GB" sz="1200" b="0">
-                          <a:solidFill>
-                            <a:schemeClr val="bg1"/>
-                          </a:solidFill>
-                        </a:rPr>
-                        <a:t>030-3456789</a:t>
-                      </a:r>
-                    </a:p>
-                  </a:txBody>
-                  <a:tcPr>
-                    <a:solidFill>
-                      <a:schemeClr val="bg1">
-                        <a:lumMod val="50000"/>
-                      </a:schemeClr>
-                    </a:solidFill>
-                  </a:tcPr>
-                </a:tc>
               </a:tr>
               <a:tr h="381000">
                 <a:tc>
@@ -3611,30 +3560,6 @@
                     </a:solidFill>
                   </a:tcPr>
                 </a:tc>
-                <a:tc>
-                  <a:txBody>
-                    <a:bodyPr vert="horz" wrap="square"/>
-                    <a:lstStyle/>
-                    <a:p>
-                      <a:pPr>
-                        <a:buNone/>
-                      </a:pPr>
-                      <a:r>
-                        <a:rPr lang="en-GB" sz="1200" b="0">
-                          <a:solidFill>
-                            <a:schemeClr val="bg1"/>
-                          </a:solidFill>
-                        </a:rPr>
-                        <a:t>(5) 789-0123</a:t>
-                      </a:r>
-                    </a:p>
-                  </a:txBody>
-                  <a:tcPr>
-                    <a:solidFill>
-                      <a:srgbClr val="666666"/>
-                    </a:solidFill>
-                  </a:tcPr>
-                </a:tc>
               </a:tr>
               <a:tr h="381000">
                 <a:tc>
@@ -3793,32 +3718,6 @@
                     </a:solidFill>
                   </a:tcPr>
                 </a:tc>
-                <a:tc>
-                  <a:txBody>
-                    <a:bodyPr vert="horz" wrap="square"/>
-                    <a:lstStyle/>
-                    <a:p>
-                      <a:pPr>
-                        <a:buNone/>
-                      </a:pPr>
-                      <a:r>
-                        <a:rPr lang="en-GB" sz="1200" b="0">
-                          <a:solidFill>
-                            <a:schemeClr val="bg1"/>
-                          </a:solidFill>
-                        </a:rPr>
-                        <a:t>(5) 123-4567</a:t>
-                      </a:r>
-                    </a:p>
-                  </a:txBody>
-                  <a:tcPr>
-                    <a:solidFill>
-                      <a:schemeClr val="bg1">
-                        <a:lumMod val="50000"/>
-                      </a:schemeClr>
-                    </a:solidFill>
-                  </a:tcPr>
-                </a:tc>
               </a:tr>
               <a:tr h="381000">
                 <a:tc>
@@ -3965,30 +3864,6 @@
                     </a:solidFill>
                   </a:tcPr>
                 </a:tc>
-                <a:tc>
-                  <a:txBody>
-                    <a:bodyPr vert="horz" wrap="square"/>
-                    <a:lstStyle/>
-                    <a:p>
-                      <a:pPr>
-                        <a:buNone/>
-                      </a:pPr>
-                      <a:r>
-                        <a:rPr lang="en-GB" sz="1200" b="0">
-                          <a:solidFill>
-                            <a:schemeClr val="bg1"/>
-                          </a:solidFill>
-                        </a:rPr>
-                        <a:t>(171) 456-7890</a:t>
-                      </a:r>
-                    </a:p>
-                  </a:txBody>
-                  <a:tcPr>
-                    <a:solidFill>
-                      <a:srgbClr val="666666"/>
-                    </a:solidFill>
-                  </a:tcPr>
-                </a:tc>
               </a:tr>
               <a:tr h="381000">
                 <a:tc>
@@ -4147,32 +4022,6 @@
                     </a:solidFill>
                   </a:tcPr>
                 </a:tc>
-                <a:tc>
-                  <a:txBody>
-                    <a:bodyPr vert="horz" wrap="square"/>
-                    <a:lstStyle/>
-                    <a:p>
-                      <a:pPr>
-                        <a:buNone/>
-                      </a:pPr>
-                      <a:r>
-                        <a:rPr lang="en-GB" sz="1200" b="0">
-                          <a:solidFill>
-                            <a:schemeClr val="bg1"/>
-                          </a:solidFill>
-                        </a:rPr>
-                        <a:t>0921-67 89 01</a:t>
-                      </a:r>
-                    </a:p>
-                  </a:txBody>
-                  <a:tcPr>
-                    <a:solidFill>
-                      <a:schemeClr val="bg1">
-                        <a:lumMod val="50000"/>
-                      </a:schemeClr>
-                    </a:solidFill>
-                  </a:tcPr>
-                </a:tc>
               </a:tr>
               <a:tr h="381000">
                 <a:tc>
@@ -4319,30 +4168,6 @@
                     </a:solidFill>
                   </a:tcPr>
                 </a:tc>
-                <a:tc>
-                  <a:txBody>
-                    <a:bodyPr vert="horz" wrap="square"/>
-                    <a:lstStyle/>
-                    <a:p>
-                      <a:pPr>
-                        <a:buNone/>
-                      </a:pPr>
-                      <a:r>
-                        <a:rPr lang="en-GB" sz="1200" b="0">
-                          <a:solidFill>
-                            <a:schemeClr val="bg1"/>
-                          </a:solidFill>
-                        </a:rPr>
-                        <a:t>0621-67890</a:t>
-                      </a:r>
-                    </a:p>
-                  </a:txBody>
-                  <a:tcPr>
-                    <a:solidFill>
-                      <a:srgbClr val="666666"/>
-                    </a:solidFill>
-                  </a:tcPr>
-                </a:tc>
               </a:tr>
               <a:tr h="381000">
                 <a:tc>
@@ -4501,32 +4326,6 @@
                     </a:solidFill>
                   </a:tcPr>
                 </a:tc>
-                <a:tc>
-                  <a:txBody>
-                    <a:bodyPr vert="horz" wrap="square"/>
-                    <a:lstStyle/>
-                    <a:p>
-                      <a:pPr>
-                        <a:buNone/>
-                      </a:pPr>
-                      <a:r>
-                        <a:rPr lang="en-GB" sz="1200" b="0">
-                          <a:solidFill>
-                            <a:schemeClr val="bg1"/>
-                          </a:solidFill>
-                        </a:rPr>
-                        <a:t>67.89.01.23</a:t>
-                      </a:r>
-                    </a:p>
-                  </a:txBody>
-                  <a:tcPr>
-                    <a:solidFill>
-                      <a:schemeClr val="bg1">
-                        <a:lumMod val="50000"/>
-                      </a:schemeClr>
-                    </a:solidFill>
-                  </a:tcPr>
-                </a:tc>
               </a:tr>
               <a:tr h="381000">
                 <a:tc>
@@ -4673,30 +4472,6 @@
                     </a:solidFill>
                   </a:tcPr>
                 </a:tc>
-                <a:tc>
-                  <a:txBody>
-                    <a:bodyPr vert="horz" wrap="square"/>
-                    <a:lstStyle/>
-                    <a:p>
-                      <a:pPr>
-                        <a:buNone/>
-                      </a:pPr>
-                      <a:r>
-                        <a:rPr lang="en-GB" sz="1200" b="0">
-                          <a:solidFill>
-                            <a:schemeClr val="bg1"/>
-                          </a:solidFill>
-                        </a:rPr>
-                        <a:t>(91) 345 67 89</a:t>
-                      </a:r>
-                    </a:p>
-                  </a:txBody>
-                  <a:tcPr>
-                    <a:solidFill>
-                      <a:srgbClr val="666666"/>
-                    </a:solidFill>
-                  </a:tcPr>
-                </a:tc>
               </a:tr>
               <a:tr h="381000">
                 <a:tc>
@@ -4855,32 +4630,6 @@
                     </a:solidFill>
                   </a:tcPr>
                 </a:tc>
-                <a:tc>
-                  <a:txBody>
-                    <a:bodyPr vert="horz" wrap="square"/>
-                    <a:lstStyle/>
-                    <a:p>
-                      <a:pPr>
-                        <a:buNone/>
-                      </a:pPr>
-                      <a:r>
-                        <a:rPr lang="en-GB" sz="1200" b="0">
-                          <a:solidFill>
-                            <a:schemeClr val="bg1"/>
-                          </a:solidFill>
-                        </a:rPr>
-                        <a:t>23.45.67.89</a:t>
-                      </a:r>
-                    </a:p>
-                  </a:txBody>
-                  <a:tcPr>
-                    <a:solidFill>
-                      <a:schemeClr val="bg1">
-                        <a:lumMod val="50000"/>
-                      </a:schemeClr>
-                    </a:solidFill>
-                  </a:tcPr>
-                </a:tc>
               </a:tr>
               <a:tr h="381000">
                 <a:tc>
@@ -5027,30 +4776,6 @@
                     </a:solidFill>
                   </a:tcPr>
                 </a:tc>
-                <a:tc>
-                  <a:txBody>
-                    <a:bodyPr vert="horz" wrap="square"/>
-                    <a:lstStyle/>
-                    <a:p>
-                      <a:pPr>
-                        <a:buNone/>
-                      </a:pPr>
-                      <a:r>
-                        <a:rPr lang="en-GB" sz="1200" b="0">
-                          <a:solidFill>
-                            <a:schemeClr val="bg1"/>
-                          </a:solidFill>
-                        </a:rPr>
-                        <a:t>(604) 901-2345</a:t>
-                      </a:r>
-                    </a:p>
-                  </a:txBody>
-                  <a:tcPr>
-                    <a:solidFill>
-                      <a:srgbClr val="666666"/>
-                    </a:solidFill>
-                  </a:tcPr>
-                </a:tc>
               </a:tr>
               <a:tr h="381000">
                 <a:tc>
@@ -5198,32 +4923,6 @@
                           </a:solidFill>
                         </a:rPr>
                         <a:t>UK</a:t>
-                      </a:r>
-                    </a:p>
-                  </a:txBody>
-                  <a:tcPr>
-                    <a:solidFill>
-                      <a:schemeClr val="bg1">
-                        <a:lumMod val="50000"/>
-                      </a:schemeClr>
-                    </a:solidFill>
-                  </a:tcPr>
-                </a:tc>
-                <a:tc>
-                  <a:txBody>
-                    <a:bodyPr vert="horz" wrap="square"/>
-                    <a:lstStyle/>
-                    <a:p>
-                      <a:pPr>
-                        <a:buNone/>
-                      </a:pPr>
-                      <a:r>
-                        <a:rPr lang="en-GB" sz="1200" b="0">
-                          <a:solidFill>
-                            <a:schemeClr val="bg1"/>
-                          </a:solidFill>
-                        </a:rPr>
-                        <a:t>(171) 789-0123</a:t>
                       </a:r>
                     </a:p>
                   </a:txBody>
@@ -5384,7 +5083,7 @@
         </p:nvGraphicFramePr>
         <p:xfrm>
           <a:off x="395605" y="549275"/>
-          <a:ext cx="8343265" cy="5767705"/>
+          <a:ext cx="7151370" cy="5767705"/>
         </p:xfrm>
         <a:graphic>
           <a:graphicData uri="http://schemas.openxmlformats.org/drawingml/2006/table">
@@ -5399,7 +5098,6 @@
                 <a:gridCol w="1191895"/>
                 <a:gridCol w="1191895"/>
                 <a:gridCol w="1191895"/>
-                <a:gridCol w="1191895"/>
               </a:tblGrid>
               <a:tr h="372745">
                 <a:tc>
@@ -5546,30 +5244,6 @@
                     </a:solidFill>
                   </a:tcPr>
                 </a:tc>
-                <a:tc>
-                  <a:txBody>
-                    <a:bodyPr vert="horz" wrap="square"/>
-                    <a:lstStyle/>
-                    <a:p>
-                      <a:pPr>
-                        <a:buNone/>
-                      </a:pPr>
-                      <a:r>
-                        <a:rPr lang="en-GB" sz="1200">
-                          <a:solidFill>
-                            <a:schemeClr val="bg1"/>
-                          </a:solidFill>
-                        </a:rPr>
-                        <a:t>Phone</a:t>
-                      </a:r>
-                    </a:p>
-                  </a:txBody>
-                  <a:tcPr>
-                    <a:solidFill>
-                      <a:srgbClr val="666666"/>
-                    </a:solidFill>
-                  </a:tcPr>
-                </a:tc>
               </a:tr>
               <a:tr h="381000">
                 <a:tc>
@@ -5716,30 +5390,6 @@
                     </a:solidFill>
                   </a:tcPr>
                 </a:tc>
-                <a:tc>
-                  <a:txBody>
-                    <a:bodyPr vert="horz" wrap="square"/>
-                    <a:lstStyle/>
-                    <a:p>
-                      <a:pPr>
-                        <a:buNone/>
-                      </a:pPr>
-                      <a:r>
-                        <a:rPr lang="en-GB" sz="1200" b="0">
-                          <a:solidFill>
-                            <a:schemeClr val="bg1"/>
-                          </a:solidFill>
-                        </a:rPr>
-                        <a:t>(1) 890-1234</a:t>
-                      </a:r>
-                    </a:p>
-                  </a:txBody>
-                  <a:tcPr>
-                    <a:solidFill>
-                      <a:srgbClr val="666666"/>
-                    </a:solidFill>
-                  </a:tcPr>
-                </a:tc>
               </a:tr>
               <a:tr h="381000">
                 <a:tc>
@@ -5898,32 +5548,6 @@
                     </a:solidFill>
                   </a:tcPr>
                 </a:tc>
-                <a:tc>
-                  <a:txBody>
-                    <a:bodyPr vert="horz" wrap="square"/>
-                    <a:lstStyle/>
-                    <a:p>
-                      <a:pPr>
-                        <a:buNone/>
-                      </a:pPr>
-                      <a:r>
-                        <a:rPr lang="en-GB" sz="1200" b="0">
-                          <a:solidFill>
-                            <a:schemeClr val="bg1"/>
-                          </a:solidFill>
-                        </a:rPr>
-                        <a:t>(5) 456-7890</a:t>
-                      </a:r>
-                    </a:p>
-                  </a:txBody>
-                  <a:tcPr>
-                    <a:solidFill>
-                      <a:schemeClr val="bg1">
-                        <a:lumMod val="50000"/>
-                      </a:schemeClr>
-                    </a:solidFill>
-                  </a:tcPr>
-                </a:tc>
               </a:tr>
               <a:tr h="381000">
                 <a:tc>
@@ -6070,30 +5694,6 @@
                     </a:solidFill>
                   </a:tcPr>
                 </a:tc>
-                <a:tc>
-                  <a:txBody>
-                    <a:bodyPr vert="horz" wrap="square"/>
-                    <a:lstStyle/>
-                    <a:p>
-                      <a:pPr>
-                        <a:buNone/>
-                      </a:pPr>
-                      <a:r>
-                        <a:rPr lang="en-GB" sz="1200" b="0">
-                          <a:solidFill>
-                            <a:schemeClr val="bg1"/>
-                          </a:solidFill>
-                        </a:rPr>
-                        <a:t>0452-678901</a:t>
-                      </a:r>
-                    </a:p>
-                  </a:txBody>
-                  <a:tcPr>
-                    <a:solidFill>
-                      <a:srgbClr val="666666"/>
-                    </a:solidFill>
-                  </a:tcPr>
-                </a:tc>
               </a:tr>
               <a:tr h="381000">
                 <a:tc>
@@ -6252,32 +5852,6 @@
                     </a:solidFill>
                   </a:tcPr>
                 </a:tc>
-                <a:tc>
-                  <a:txBody>
-                    <a:bodyPr vert="horz" wrap="square"/>
-                    <a:lstStyle/>
-                    <a:p>
-                      <a:pPr>
-                        <a:buNone/>
-                      </a:pPr>
-                      <a:r>
-                        <a:rPr lang="en-GB" sz="1200" b="0">
-                          <a:solidFill>
-                            <a:schemeClr val="bg1"/>
-                          </a:solidFill>
-                        </a:rPr>
-                        <a:t>(11) 012-3456</a:t>
-                      </a:r>
-                    </a:p>
-                  </a:txBody>
-                  <a:tcPr>
-                    <a:solidFill>
-                      <a:schemeClr val="bg1">
-                        <a:lumMod val="50000"/>
-                      </a:schemeClr>
-                    </a:solidFill>
-                  </a:tcPr>
-                </a:tc>
               </a:tr>
               <a:tr h="381000">
                 <a:tc>
@@ -6424,30 +5998,6 @@
                     </a:solidFill>
                   </a:tcPr>
                 </a:tc>
-                <a:tc>
-                  <a:txBody>
-                    <a:bodyPr vert="horz" wrap="square"/>
-                    <a:lstStyle/>
-                    <a:p>
-                      <a:pPr>
-                        <a:buNone/>
-                      </a:pPr>
-                      <a:r>
-                        <a:rPr lang="en-GB" sz="1200" b="0">
-                          <a:solidFill>
-                            <a:schemeClr val="bg1"/>
-                          </a:solidFill>
-                        </a:rPr>
-                        <a:t>(171) 234-5678</a:t>
-                      </a:r>
-                    </a:p>
-                  </a:txBody>
-                  <a:tcPr>
-                    <a:solidFill>
-                      <a:srgbClr val="666666"/>
-                    </a:solidFill>
-                  </a:tcPr>
-                </a:tc>
               </a:tr>
               <a:tr h="381000">
                 <a:tc>
@@ -6606,32 +6156,6 @@
                     </a:solidFill>
                   </a:tcPr>
                 </a:tc>
-                <a:tc>
-                  <a:txBody>
-                    <a:bodyPr vert="horz" wrap="square"/>
-                    <a:lstStyle/>
-                    <a:p>
-                      <a:pPr>
-                        <a:buNone/>
-                      </a:pPr>
-                      <a:r>
-                        <a:rPr lang="en-GB" sz="1200" b="0">
-                          <a:solidFill>
-                            <a:schemeClr val="bg1"/>
-                          </a:solidFill>
-                        </a:rPr>
-                        <a:t>0241-789012</a:t>
-                      </a:r>
-                    </a:p>
-                  </a:txBody>
-                  <a:tcPr>
-                    <a:solidFill>
-                      <a:schemeClr val="bg1">
-                        <a:lumMod val="50000"/>
-                      </a:schemeClr>
-                    </a:solidFill>
-                  </a:tcPr>
-                </a:tc>
               </a:tr>
               <a:tr h="381000">
                 <a:tc>
@@ -6778,30 +6302,6 @@
                     </a:solidFill>
                   </a:tcPr>
                 </a:tc>
-                <a:tc>
-                  <a:txBody>
-                    <a:bodyPr vert="horz" wrap="square"/>
-                    <a:lstStyle/>
-                    <a:p>
-                      <a:pPr>
-                        <a:buNone/>
-                      </a:pPr>
-                      <a:r>
-                        <a:rPr lang="en-GB" sz="1200" b="0">
-                          <a:solidFill>
-                            <a:schemeClr val="bg1"/>
-                          </a:solidFill>
-                        </a:rPr>
-                        <a:t>89.01.23.45</a:t>
-                      </a:r>
-                    </a:p>
-                  </a:txBody>
-                  <a:tcPr>
-                    <a:solidFill>
-                      <a:srgbClr val="666666"/>
-                    </a:solidFill>
-                  </a:tcPr>
-                </a:tc>
               </a:tr>
               <a:tr h="381000">
                 <a:tc>
@@ -6960,32 +6460,6 @@
                     </a:solidFill>
                   </a:tcPr>
                 </a:tc>
-                <a:tc>
-                  <a:txBody>
-                    <a:bodyPr vert="horz" wrap="square"/>
-                    <a:lstStyle/>
-                    <a:p>
-                      <a:pPr>
-                        <a:buNone/>
-                      </a:pPr>
-                      <a:r>
-                        <a:rPr lang="en-GB" sz="1200" b="0">
-                          <a:solidFill>
-                            <a:schemeClr val="bg1"/>
-                          </a:solidFill>
-                        </a:rPr>
-                        <a:t>(171) 345-6789</a:t>
-                      </a:r>
-                    </a:p>
-                  </a:txBody>
-                  <a:tcPr>
-                    <a:solidFill>
-                      <a:schemeClr val="bg1">
-                        <a:lumMod val="50000"/>
-                      </a:schemeClr>
-                    </a:solidFill>
-                  </a:tcPr>
-                </a:tc>
               </a:tr>
               <a:tr h="381000">
                 <a:tc>
@@ -7132,30 +6606,6 @@
                     </a:solidFill>
                   </a:tcPr>
                 </a:tc>
-                <a:tc>
-                  <a:txBody>
-                    <a:bodyPr vert="horz" wrap="square"/>
-                    <a:lstStyle/>
-                    <a:p>
-                      <a:pPr>
-                        <a:buNone/>
-                      </a:pPr>
-                      <a:r>
-                        <a:rPr lang="en-GB" sz="1200" b="0">
-                          <a:solidFill>
-                            <a:schemeClr val="bg1"/>
-                          </a:solidFill>
-                        </a:rPr>
-                        <a:t>1234-5678</a:t>
-                      </a:r>
-                    </a:p>
-                  </a:txBody>
-                  <a:tcPr>
-                    <a:solidFill>
-                      <a:srgbClr val="666666"/>
-                    </a:solidFill>
-                  </a:tcPr>
-                </a:tc>
               </a:tr>
               <a:tr h="381000">
                 <a:tc>
@@ -7314,32 +6764,6 @@
                     </a:solidFill>
                   </a:tcPr>
                 </a:tc>
-                <a:tc>
-                  <a:txBody>
-                    <a:bodyPr vert="horz" wrap="square"/>
-                    <a:lstStyle/>
-                    <a:p>
-                      <a:pPr>
-                        <a:buNone/>
-                      </a:pPr>
-                      <a:r>
-                        <a:rPr lang="en-GB" sz="1200" b="0">
-                          <a:solidFill>
-                            <a:schemeClr val="bg1"/>
-                          </a:solidFill>
-                        </a:rPr>
-                        <a:t>(11) 456-7890</a:t>
-                      </a:r>
-                    </a:p>
-                  </a:txBody>
-                  <a:tcPr>
-                    <a:solidFill>
-                      <a:schemeClr val="bg1">
-                        <a:lumMod val="50000"/>
-                      </a:schemeClr>
-                    </a:solidFill>
-                  </a:tcPr>
-                </a:tc>
               </a:tr>
               <a:tr h="381000">
                 <a:tc>
@@ -7477,30 +6901,6 @@
                           </a:solidFill>
                         </a:rPr>
                         <a:t>Spain</a:t>
-                      </a:r>
-                    </a:p>
-                  </a:txBody>
-                  <a:tcPr>
-                    <a:solidFill>
-                      <a:srgbClr val="666666"/>
-                    </a:solidFill>
-                  </a:tcPr>
-                </a:tc>
-                <a:tc>
-                  <a:txBody>
-                    <a:bodyPr vert="horz" wrap="square"/>
-                    <a:lstStyle/>
-                    <a:p>
-                      <a:pPr>
-                        <a:buNone/>
-                      </a:pPr>
-                      <a:r>
-                        <a:rPr lang="en-GB" sz="1200" b="0">
-                          <a:solidFill>
-                            <a:schemeClr val="bg1"/>
-                          </a:solidFill>
-                        </a:rPr>
-                        <a:t>(91) 890 12 34</a:t>
                       </a:r>
                     </a:p>
                   </a:txBody>
@@ -7730,7 +7130,7 @@
         </p:nvGraphicFramePr>
         <p:xfrm>
           <a:off x="395605" y="549275"/>
-          <a:ext cx="8343265" cy="5508625"/>
+          <a:ext cx="7151370" cy="5508625"/>
         </p:xfrm>
         <a:graphic>
           <a:graphicData uri="http://schemas.openxmlformats.org/drawingml/2006/table">
@@ -7745,7 +7145,6 @@
                 <a:gridCol w="1191895"/>
                 <a:gridCol w="1191895"/>
                 <a:gridCol w="1191895"/>
-                <a:gridCol w="1191895"/>
               </a:tblGrid>
               <a:tr h="372745">
                 <a:tc>
@@ -7892,30 +7291,6 @@
                     </a:solidFill>
                   </a:tcPr>
                 </a:tc>
-                <a:tc>
-                  <a:txBody>
-                    <a:bodyPr vert="horz" wrap="square"/>
-                    <a:lstStyle/>
-                    <a:p>
-                      <a:pPr>
-                        <a:buNone/>
-                      </a:pPr>
-                      <a:r>
-                        <a:rPr lang="en-GB" sz="1200">
-                          <a:solidFill>
-                            <a:schemeClr val="bg1"/>
-                          </a:solidFill>
-                        </a:rPr>
-                        <a:t>Phone</a:t>
-                      </a:r>
-                    </a:p>
-                  </a:txBody>
-                  <a:tcPr>
-                    <a:solidFill>
-                      <a:srgbClr val="666666"/>
-                    </a:solidFill>
-                  </a:tcPr>
-                </a:tc>
               </a:tr>
               <a:tr h="381000">
                 <a:tc>
@@ -8074,32 +7449,6 @@
                     </a:solidFill>
                   </a:tcPr>
                 </a:tc>
-                <a:tc>
-                  <a:txBody>
-                    <a:bodyPr vert="horz" wrap="square"/>
-                    <a:lstStyle/>
-                    <a:p>
-                      <a:pPr>
-                        <a:buNone/>
-                      </a:pPr>
-                      <a:r>
-                        <a:rPr lang="en-GB" sz="1200" b="0">
-                          <a:solidFill>
-                            <a:schemeClr val="bg1"/>
-                          </a:solidFill>
-                        </a:rPr>
-                        <a:t>45.67.89.01</a:t>
-                      </a:r>
-                    </a:p>
-                  </a:txBody>
-                  <a:tcPr>
-                    <a:solidFill>
-                      <a:schemeClr val="bg1">
-                        <a:lumMod val="50000"/>
-                      </a:schemeClr>
-                    </a:solidFill>
-                  </a:tcPr>
-                </a:tc>
               </a:tr>
               <a:tr h="381000">
                 <a:tc>
@@ -8246,30 +7595,6 @@
                     </a:solidFill>
                   </a:tcPr>
                 </a:tc>
-                <a:tc>
-                  <a:txBody>
-                    <a:bodyPr vert="horz" wrap="square"/>
-                    <a:lstStyle/>
-                    <a:p>
-                      <a:pPr>
-                        <a:buNone/>
-                      </a:pPr>
-                      <a:r>
-                        <a:rPr lang="en-GB" sz="1200" b="0">
-                          <a:solidFill>
-                            <a:schemeClr val="bg1"/>
-                          </a:solidFill>
-                        </a:rPr>
-                        <a:t>0695-67 89 01</a:t>
-                      </a:r>
-                    </a:p>
-                  </a:txBody>
-                  <a:tcPr>
-                    <a:solidFill>
-                      <a:srgbClr val="666666"/>
-                    </a:solidFill>
-                  </a:tcPr>
-                </a:tc>
               </a:tr>
               <a:tr h="381000">
                 <a:tc>
@@ -8428,32 +7753,6 @@
                     </a:solidFill>
                   </a:tcPr>
                 </a:tc>
-                <a:tc>
-                  <a:txBody>
-                    <a:bodyPr vert="horz" wrap="square"/>
-                    <a:lstStyle/>
-                    <a:p>
-                      <a:pPr>
-                        <a:buNone/>
-                      </a:pPr>
-                      <a:r>
-                        <a:rPr lang="en-GB" sz="1200" b="0">
-                          <a:solidFill>
-                            <a:schemeClr val="bg1"/>
-                          </a:solidFill>
-                        </a:rPr>
-                        <a:t>089-8901234</a:t>
-                      </a:r>
-                    </a:p>
-                  </a:txBody>
-                  <a:tcPr>
-                    <a:solidFill>
-                      <a:schemeClr val="bg1">
-                        <a:lumMod val="50000"/>
-                      </a:schemeClr>
-                    </a:solidFill>
-                  </a:tcPr>
-                </a:tc>
               </a:tr>
               <a:tr h="381000">
                 <a:tc>
@@ -8600,30 +7899,6 @@
                     </a:solidFill>
                   </a:tcPr>
                 </a:tc>
-                <a:tc>
-                  <a:txBody>
-                    <a:bodyPr vert="horz" wrap="square"/>
-                    <a:lstStyle/>
-                    <a:p>
-                      <a:pPr>
-                        <a:buNone/>
-                      </a:pPr>
-                      <a:r>
-                        <a:rPr lang="en-GB" sz="1200" b="0">
-                          <a:solidFill>
-                            <a:schemeClr val="bg1"/>
-                          </a:solidFill>
-                        </a:rPr>
-                        <a:t>34.56.78.90</a:t>
-                      </a:r>
-                    </a:p>
-                  </a:txBody>
-                  <a:tcPr>
-                    <a:solidFill>
-                      <a:srgbClr val="666666"/>
-                    </a:solidFill>
-                  </a:tcPr>
-                </a:tc>
               </a:tr>
               <a:tr h="381000">
                 <a:tc>
@@ -8782,32 +8057,6 @@
                     </a:solidFill>
                   </a:tcPr>
                 </a:tc>
-                <a:tc>
-                  <a:txBody>
-                    <a:bodyPr vert="horz" wrap="square"/>
-                    <a:lstStyle/>
-                    <a:p>
-                      <a:pPr>
-                        <a:buNone/>
-                      </a:pPr>
-                      <a:r>
-                        <a:rPr lang="en-GB" sz="1200" b="0">
-                          <a:solidFill>
-                            <a:schemeClr val="bg1"/>
-                          </a:solidFill>
-                        </a:rPr>
-                        <a:t>011-2345678</a:t>
-                      </a:r>
-                    </a:p>
-                  </a:txBody>
-                  <a:tcPr>
-                    <a:solidFill>
-                      <a:schemeClr val="bg1">
-                        <a:lumMod val="50000"/>
-                      </a:schemeClr>
-                    </a:solidFill>
-                  </a:tcPr>
-                </a:tc>
               </a:tr>
               <a:tr h="381000">
                 <a:tc>
@@ -8954,30 +8203,6 @@
                     </a:solidFill>
                   </a:tcPr>
                 </a:tc>
-                <a:tc>
-                  <a:txBody>
-                    <a:bodyPr vert="horz" wrap="square"/>
-                    <a:lstStyle/>
-                    <a:p>
-                      <a:pPr>
-                        <a:buNone/>
-                      </a:pPr>
-                      <a:r>
-                        <a:rPr lang="en-GB" sz="1200" b="0">
-                          <a:solidFill>
-                            <a:schemeClr val="bg1"/>
-                          </a:solidFill>
-                        </a:rPr>
-                        <a:t>(1) 456-7890</a:t>
-                      </a:r>
-                    </a:p>
-                  </a:txBody>
-                  <a:tcPr>
-                    <a:solidFill>
-                      <a:srgbClr val="666666"/>
-                    </a:solidFill>
-                  </a:tcPr>
-                </a:tc>
               </a:tr>
               <a:tr h="381000">
                 <a:tc>
@@ -9136,32 +8361,6 @@
                     </a:solidFill>
                   </a:tcPr>
                 </a:tc>
-                <a:tc>
-                  <a:txBody>
-                    <a:bodyPr vert="horz" wrap="square"/>
-                    <a:lstStyle/>
-                    <a:p>
-                      <a:pPr>
-                        <a:buNone/>
-                      </a:pPr>
-                      <a:r>
-                        <a:rPr lang="en-GB" sz="1200" b="0">
-                          <a:solidFill>
-                            <a:schemeClr val="bg1"/>
-                          </a:solidFill>
-                        </a:rPr>
-                        <a:t>(93) 789 0123</a:t>
-                      </a:r>
-                    </a:p>
-                  </a:txBody>
-                  <a:tcPr>
-                    <a:solidFill>
-                      <a:schemeClr val="bg1">
-                        <a:lumMod val="50000"/>
-                      </a:schemeClr>
-                    </a:solidFill>
-                  </a:tcPr>
-                </a:tc>
               </a:tr>
               <a:tr h="381000">
                 <a:tc>
@@ -9308,30 +8507,6 @@
                     </a:solidFill>
                   </a:tcPr>
                 </a:tc>
-                <a:tc>
-                  <a:txBody>
-                    <a:bodyPr vert="horz" wrap="square"/>
-                    <a:lstStyle/>
-                    <a:p>
-                      <a:pPr>
-                        <a:buNone/>
-                      </a:pPr>
-                      <a:r>
-                        <a:rPr lang="en-GB" sz="1200" b="0">
-                          <a:solidFill>
-                            <a:schemeClr val="bg1"/>
-                          </a:solidFill>
-                        </a:rPr>
-                        <a:t>(95) 901 23 45</a:t>
-                      </a:r>
-                    </a:p>
-                  </a:txBody>
-                  <a:tcPr>
-                    <a:solidFill>
-                      <a:srgbClr val="666666"/>
-                    </a:solidFill>
-                  </a:tcPr>
-                </a:tc>
               </a:tr>
               <a:tr h="381000">
                 <a:tc>
@@ -9490,32 +8665,6 @@
                     </a:solidFill>
                   </a:tcPr>
                 </a:tc>
-                <a:tc>
-                  <a:txBody>
-                    <a:bodyPr vert="horz" wrap="square"/>
-                    <a:lstStyle/>
-                    <a:p>
-                      <a:pPr>
-                        <a:buNone/>
-                      </a:pPr>
-                      <a:r>
-                        <a:rPr lang="en-GB" sz="1200" b="0">
-                          <a:solidFill>
-                            <a:schemeClr val="bg1"/>
-                          </a:solidFill>
-                        </a:rPr>
-                        <a:t>(11) 567-8901</a:t>
-                      </a:r>
-                    </a:p>
-                  </a:txBody>
-                  <a:tcPr>
-                    <a:solidFill>
-                      <a:schemeClr val="bg1">
-                        <a:lumMod val="50000"/>
-                      </a:schemeClr>
-                    </a:solidFill>
-                  </a:tcPr>
-                </a:tc>
               </a:tr>
               <a:tr h="381000">
                 <a:tc>
@@ -9662,30 +8811,6 @@
                     </a:solidFill>
                   </a:tcPr>
                 </a:tc>
-                <a:tc>
-                  <a:txBody>
-                    <a:bodyPr vert="horz" wrap="square"/>
-                    <a:lstStyle/>
-                    <a:p>
-                      <a:pPr>
-                        <a:buNone/>
-                      </a:pPr>
-                      <a:r>
-                        <a:rPr lang="en-GB" sz="1200" b="0">
-                          <a:solidFill>
-                            <a:schemeClr val="bg1"/>
-                          </a:solidFill>
-                        </a:rPr>
-                        <a:t>(503) 555-0122</a:t>
-                      </a:r>
-                    </a:p>
-                  </a:txBody>
-                  <a:tcPr>
-                    <a:solidFill>
-                      <a:srgbClr val="666666"/>
-                    </a:solidFill>
-                  </a:tcPr>
-                </a:tc>
               </a:tr>
               <a:tr h="381000">
                 <a:tc>
@@ -9833,32 +8958,6 @@
                           </a:solidFill>
                         </a:rPr>
                         <a:t>Venezuela</a:t>
-                      </a:r>
-                    </a:p>
-                  </a:txBody>
-                  <a:tcPr>
-                    <a:solidFill>
-                      <a:schemeClr val="bg1">
-                        <a:lumMod val="50000"/>
-                      </a:schemeClr>
-                    </a:solidFill>
-                  </a:tcPr>
-                </a:tc>
-                <a:tc>
-                  <a:txBody>
-                    <a:bodyPr vert="horz" wrap="square"/>
-                    <a:lstStyle/>
-                    <a:p>
-                      <a:pPr>
-                        <a:buNone/>
-                      </a:pPr>
-                      <a:r>
-                        <a:rPr lang="en-GB" sz="1200" b="0">
-                          <a:solidFill>
-                            <a:schemeClr val="bg1"/>
-                          </a:solidFill>
-                        </a:rPr>
-                        <a:t>(2) 789-0123</a:t>
                       </a:r>
                     </a:p>
                   </a:txBody>
@@ -10090,7 +9189,7 @@
         </p:nvGraphicFramePr>
         <p:xfrm>
           <a:off x="395605" y="549275"/>
-          <a:ext cx="8343265" cy="5950585"/>
+          <a:ext cx="7151370" cy="5950585"/>
         </p:xfrm>
         <a:graphic>
           <a:graphicData uri="http://schemas.openxmlformats.org/drawingml/2006/table">
@@ -10105,7 +9204,6 @@
                 <a:gridCol w="1191895"/>
                 <a:gridCol w="1191895"/>
                 <a:gridCol w="1191895"/>
-                <a:gridCol w="1191895"/>
               </a:tblGrid>
               <a:tr h="372745">
                 <a:tc>
@@ -10252,30 +9350,6 @@
                     </a:solidFill>
                   </a:tcPr>
                 </a:tc>
-                <a:tc>
-                  <a:txBody>
-                    <a:bodyPr vert="horz" wrap="square"/>
-                    <a:lstStyle/>
-                    <a:p>
-                      <a:pPr>
-                        <a:buNone/>
-                      </a:pPr>
-                      <a:r>
-                        <a:rPr lang="en-GB" sz="1200">
-                          <a:solidFill>
-                            <a:schemeClr val="bg1"/>
-                          </a:solidFill>
-                        </a:rPr>
-                        <a:t>Phone</a:t>
-                      </a:r>
-                    </a:p>
-                  </a:txBody>
-                  <a:tcPr>
-                    <a:solidFill>
-                      <a:srgbClr val="666666"/>
-                    </a:solidFill>
-                  </a:tcPr>
-                </a:tc>
               </a:tr>
               <a:tr h="381000">
                 <a:tc>
@@ -10422,30 +9496,6 @@
                     </a:solidFill>
                   </a:tcPr>
                 </a:tc>
-                <a:tc>
-                  <a:txBody>
-                    <a:bodyPr vert="horz" wrap="square"/>
-                    <a:lstStyle/>
-                    <a:p>
-                      <a:pPr>
-                        <a:buNone/>
-                      </a:pPr>
-                      <a:r>
-                        <a:rPr lang="en-GB" sz="1200" b="0">
-                          <a:solidFill>
-                            <a:schemeClr val="bg1"/>
-                          </a:solidFill>
-                        </a:rPr>
-                        <a:t>(21) 789-0123</a:t>
-                      </a:r>
-                    </a:p>
-                  </a:txBody>
-                  <a:tcPr>
-                    <a:solidFill>
-                      <a:srgbClr val="666666"/>
-                    </a:solidFill>
-                  </a:tcPr>
-                </a:tc>
               </a:tr>
               <a:tr h="381000">
                 <a:tc>
@@ -10604,32 +9654,6 @@
                     </a:solidFill>
                   </a:tcPr>
                 </a:tc>
-                <a:tc>
-                  <a:txBody>
-                    <a:bodyPr vert="horz" wrap="square"/>
-                    <a:lstStyle/>
-                    <a:p>
-                      <a:pPr>
-                        <a:buNone/>
-                      </a:pPr>
-                      <a:r>
-                        <a:rPr lang="en-GB" sz="1200" b="0">
-                          <a:solidFill>
-                            <a:schemeClr val="bg1"/>
-                          </a:solidFill>
-                        </a:rPr>
-                        <a:t>(5) 567-8901</a:t>
-                      </a:r>
-                    </a:p>
-                  </a:txBody>
-                  <a:tcPr>
-                    <a:solidFill>
-                      <a:schemeClr val="bg1">
-                        <a:lumMod val="50000"/>
-                      </a:schemeClr>
-                    </a:solidFill>
-                  </a:tcPr>
-                </a:tc>
               </a:tr>
               <a:tr h="381000">
                 <a:tc>
@@ -10776,30 +9800,6 @@
                     </a:solidFill>
                   </a:tcPr>
                 </a:tc>
-                <a:tc>
-                  <a:txBody>
-                    <a:bodyPr vert="horz" wrap="square"/>
-                    <a:lstStyle/>
-                    <a:p>
-                      <a:pPr>
-                        <a:buNone/>
-                      </a:pPr>
-                      <a:r>
-                        <a:rPr lang="en-GB" sz="1200" b="0">
-                          <a:solidFill>
-                            <a:schemeClr val="bg1"/>
-                          </a:solidFill>
-                        </a:rPr>
-                        <a:t>(503) 555-0126</a:t>
-                      </a:r>
-                    </a:p>
-                  </a:txBody>
-                  <a:tcPr>
-                    <a:solidFill>
-                      <a:srgbClr val="666666"/>
-                    </a:solidFill>
-                  </a:tcPr>
-                </a:tc>
               </a:tr>
               <a:tr h="381000">
                 <a:tc>
@@ -10958,32 +9958,6 @@
                     </a:solidFill>
                   </a:tcPr>
                 </a:tc>
-                <a:tc>
-                  <a:txBody>
-                    <a:bodyPr vert="horz" wrap="square"/>
-                    <a:lstStyle/>
-                    <a:p>
-                      <a:pPr>
-                        <a:buNone/>
-                      </a:pPr>
-                      <a:r>
-                        <a:rPr lang="en-GB" sz="1200" b="0">
-                          <a:solidFill>
-                            <a:schemeClr val="bg1"/>
-                          </a:solidFill>
-                        </a:rPr>
-                        <a:t>8901 234</a:t>
-                      </a:r>
-                    </a:p>
-                  </a:txBody>
-                  <a:tcPr>
-                    <a:solidFill>
-                      <a:schemeClr val="bg1">
-                        <a:lumMod val="50000"/>
-                      </a:schemeClr>
-                    </a:solidFill>
-                  </a:tcPr>
-                </a:tc>
               </a:tr>
               <a:tr h="381000">
                 <a:tc>
@@ -11130,30 +10104,6 @@
                     </a:solidFill>
                   </a:tcPr>
                 </a:tc>
-                <a:tc>
-                  <a:txBody>
-                    <a:bodyPr vert="horz" wrap="square"/>
-                    <a:lstStyle/>
-                    <a:p>
-                      <a:pPr>
-                        <a:buNone/>
-                      </a:pPr>
-                      <a:r>
-                        <a:rPr lang="en-GB" sz="1200" b="0">
-                          <a:solidFill>
-                            <a:schemeClr val="bg1"/>
-                          </a:solidFill>
-                        </a:rPr>
-                        <a:t>(198) 567-8901</a:t>
-                      </a:r>
-                    </a:p>
-                  </a:txBody>
-                  <a:tcPr>
-                    <a:solidFill>
-                      <a:srgbClr val="666666"/>
-                    </a:solidFill>
-                  </a:tcPr>
-                </a:tc>
               </a:tr>
               <a:tr h="381000">
                 <a:tc>
@@ -11312,32 +10262,6 @@
                     </a:solidFill>
                   </a:tcPr>
                 </a:tc>
-                <a:tc>
-                  <a:txBody>
-                    <a:bodyPr vert="horz" wrap="square"/>
-                    <a:lstStyle/>
-                    <a:p>
-                      <a:pPr>
-                        <a:buNone/>
-                      </a:pPr>
-                      <a:r>
-                        <a:rPr lang="en-GB" sz="1200" b="0">
-                          <a:solidFill>
-                            <a:schemeClr val="bg1"/>
-                          </a:solidFill>
-                        </a:rPr>
-                        <a:t>0555-34567</a:t>
-                      </a:r>
-                    </a:p>
-                  </a:txBody>
-                  <a:tcPr>
-                    <a:solidFill>
-                      <a:schemeClr val="bg1">
-                        <a:lumMod val="50000"/>
-                      </a:schemeClr>
-                    </a:solidFill>
-                  </a:tcPr>
-                </a:tc>
               </a:tr>
               <a:tr h="381000">
                 <a:tc>
@@ -11484,30 +10408,6 @@
                     </a:solidFill>
                   </a:tcPr>
                 </a:tc>
-                <a:tc>
-                  <a:txBody>
-                    <a:bodyPr vert="horz" wrap="square"/>
-                    <a:lstStyle/>
-                    <a:p>
-                      <a:pPr>
-                        <a:buNone/>
-                      </a:pPr>
-                      <a:r>
-                        <a:rPr lang="en-GB" sz="1200" b="0">
-                          <a:solidFill>
-                            <a:schemeClr val="bg1"/>
-                          </a:solidFill>
-                        </a:rPr>
-                        <a:t>12.34.56.78</a:t>
-                      </a:r>
-                    </a:p>
-                  </a:txBody>
-                  <a:tcPr>
-                    <a:solidFill>
-                      <a:srgbClr val="666666"/>
-                    </a:solidFill>
-                  </a:tcPr>
-                </a:tc>
               </a:tr>
               <a:tr h="381000">
                 <a:tc>
@@ -11666,32 +10566,6 @@
                     </a:solidFill>
                   </a:tcPr>
                 </a:tc>
-                <a:tc>
-                  <a:txBody>
-                    <a:bodyPr vert="horz" wrap="square"/>
-                    <a:lstStyle/>
-                    <a:p>
-                      <a:pPr>
-                        <a:buNone/>
-                      </a:pPr>
-                      <a:r>
-                        <a:rPr lang="en-GB" sz="1200" b="0">
-                          <a:solidFill>
-                            <a:schemeClr val="bg1"/>
-                          </a:solidFill>
-                        </a:rPr>
-                        <a:t>90.12.34.56</a:t>
-                      </a:r>
-                    </a:p>
-                  </a:txBody>
-                  <a:tcPr>
-                    <a:solidFill>
-                      <a:schemeClr val="bg1">
-                        <a:lumMod val="50000"/>
-                      </a:schemeClr>
-                    </a:solidFill>
-                  </a:tcPr>
-                </a:tc>
               </a:tr>
               <a:tr h="381000">
                 <a:tc>
@@ -11838,30 +10712,6 @@
                     </a:solidFill>
                   </a:tcPr>
                 </a:tc>
-                <a:tc>
-                  <a:txBody>
-                    <a:bodyPr vert="horz" wrap="square"/>
-                    <a:lstStyle/>
-                    <a:p>
-                      <a:pPr>
-                        <a:buNone/>
-                      </a:pPr>
-                      <a:r>
-                        <a:rPr lang="en-GB" sz="1200" b="0">
-                          <a:solidFill>
-                            <a:schemeClr val="bg1"/>
-                          </a:solidFill>
-                        </a:rPr>
-                        <a:t>(604) 567-8901</a:t>
-                      </a:r>
-                    </a:p>
-                  </a:txBody>
-                  <a:tcPr>
-                    <a:solidFill>
-                      <a:srgbClr val="666666"/>
-                    </a:solidFill>
-                  </a:tcPr>
-                </a:tc>
               </a:tr>
               <a:tr h="381000">
                 <a:tc>
@@ -12020,32 +10870,6 @@
                     </a:solidFill>
                   </a:tcPr>
                 </a:tc>
-                <a:tc>
-                  <a:txBody>
-                    <a:bodyPr vert="horz" wrap="square"/>
-                    <a:lstStyle/>
-                    <a:p>
-                      <a:pPr>
-                        <a:buNone/>
-                      </a:pPr>
-                      <a:r>
-                        <a:rPr lang="en-GB" sz="1200" b="0">
-                          <a:solidFill>
-                            <a:schemeClr val="bg1"/>
-                          </a:solidFill>
-                        </a:rPr>
-                        <a:t>(509) 555-0119</a:t>
-                      </a:r>
-                    </a:p>
-                  </a:txBody>
-                  <a:tcPr>
-                    <a:solidFill>
-                      <a:schemeClr val="bg1">
-                        <a:lumMod val="50000"/>
-                      </a:schemeClr>
-                    </a:solidFill>
-                  </a:tcPr>
-                </a:tc>
               </a:tr>
               <a:tr h="381000">
                 <a:tc>
@@ -12183,30 +11007,6 @@
                           </a:solidFill>
                         </a:rPr>
                         <a:t>Germany</a:t>
-                      </a:r>
-                    </a:p>
-                  </a:txBody>
-                  <a:tcPr>
-                    <a:solidFill>
-                      <a:srgbClr val="666666"/>
-                    </a:solidFill>
-                  </a:tcPr>
-                </a:tc>
-                <a:tc>
-                  <a:txBody>
-                    <a:bodyPr vert="horz" wrap="square"/>
-                    <a:lstStyle/>
-                    <a:p>
-                      <a:pPr>
-                        <a:buNone/>
-                      </a:pPr>
-                      <a:r>
-                        <a:rPr lang="en-GB" sz="1200" b="0">
-                          <a:solidFill>
-                            <a:schemeClr val="bg1"/>
-                          </a:solidFill>
-                        </a:rPr>
-                        <a:t>069-7890123</a:t>
                       </a:r>
                     </a:p>
                   </a:txBody>
@@ -12436,7 +11236,7 @@
         </p:nvGraphicFramePr>
         <p:xfrm>
           <a:off x="395605" y="549275"/>
-          <a:ext cx="8343265" cy="6133465"/>
+          <a:ext cx="7151370" cy="6133465"/>
         </p:xfrm>
         <a:graphic>
           <a:graphicData uri="http://schemas.openxmlformats.org/drawingml/2006/table">
@@ -12451,7 +11251,6 @@
                 <a:gridCol w="1191895"/>
                 <a:gridCol w="1191895"/>
                 <a:gridCol w="1191895"/>
-                <a:gridCol w="1191895"/>
               </a:tblGrid>
               <a:tr h="372745">
                 <a:tc>
@@ -12598,30 +11397,6 @@
                     </a:solidFill>
                   </a:tcPr>
                 </a:tc>
-                <a:tc>
-                  <a:txBody>
-                    <a:bodyPr vert="horz" wrap="square"/>
-                    <a:lstStyle/>
-                    <a:p>
-                      <a:pPr>
-                        <a:buNone/>
-                      </a:pPr>
-                      <a:r>
-                        <a:rPr lang="en-GB" sz="1200">
-                          <a:solidFill>
-                            <a:schemeClr val="bg1"/>
-                          </a:solidFill>
-                        </a:rPr>
-                        <a:t>Phone</a:t>
-                      </a:r>
-                    </a:p>
-                  </a:txBody>
-                  <a:tcPr>
-                    <a:solidFill>
-                      <a:srgbClr val="666666"/>
-                    </a:solidFill>
-                  </a:tcPr>
-                </a:tc>
               </a:tr>
               <a:tr h="381000">
                 <a:tc>
@@ -12780,32 +11555,6 @@
                     </a:solidFill>
                   </a:tcPr>
                 </a:tc>
-                <a:tc>
-                  <a:txBody>
-                    <a:bodyPr vert="horz" wrap="square"/>
-                    <a:lstStyle/>
-                    <a:p>
-                      <a:pPr>
-                        <a:buNone/>
-                      </a:pPr>
-                      <a:r>
-                        <a:rPr lang="en-GB" sz="1200" b="0">
-                          <a:solidFill>
-                            <a:schemeClr val="bg1"/>
-                          </a:solidFill>
-                        </a:rPr>
-                        <a:t>(415) 555-0118</a:t>
-                      </a:r>
-                    </a:p>
-                  </a:txBody>
-                  <a:tcPr>
-                    <a:solidFill>
-                      <a:schemeClr val="bg1">
-                        <a:lumMod val="50000"/>
-                      </a:schemeClr>
-                    </a:solidFill>
-                  </a:tcPr>
-                </a:tc>
               </a:tr>
               <a:tr h="381000">
                 <a:tc>
@@ -12952,30 +11701,6 @@
                     </a:solidFill>
                   </a:tcPr>
                 </a:tc>
-                <a:tc>
-                  <a:txBody>
-                    <a:bodyPr vert="horz" wrap="square"/>
-                    <a:lstStyle/>
-                    <a:p>
-                      <a:pPr>
-                        <a:buNone/>
-                      </a:pPr>
-                      <a:r>
-                        <a:rPr lang="en-GB" sz="1200" b="0">
-                          <a:solidFill>
-                            <a:schemeClr val="bg1"/>
-                          </a:solidFill>
-                        </a:rPr>
-                        <a:t>(9) 789-0123</a:t>
-                      </a:r>
-                    </a:p>
-                  </a:txBody>
-                  <a:tcPr>
-                    <a:solidFill>
-                      <a:srgbClr val="666666"/>
-                    </a:solidFill>
-                  </a:tcPr>
-                </a:tc>
               </a:tr>
               <a:tr h="381000">
                 <a:tc>
@@ -13134,32 +11859,6 @@
                     </a:solidFill>
                   </a:tcPr>
                 </a:tc>
-                <a:tc>
-                  <a:txBody>
-                    <a:bodyPr vert="horz" wrap="square"/>
-                    <a:lstStyle/>
-                    <a:p>
-                      <a:pPr>
-                        <a:buNone/>
-                      </a:pPr>
-                      <a:r>
-                        <a:rPr lang="en-GB" sz="1200" b="0">
-                          <a:solidFill>
-                            <a:schemeClr val="bg1"/>
-                          </a:solidFill>
-                        </a:rPr>
-                        <a:t>(8) 01-23-45</a:t>
-                      </a:r>
-                    </a:p>
-                  </a:txBody>
-                  <a:tcPr>
-                    <a:solidFill>
-                      <a:schemeClr val="bg1">
-                        <a:lumMod val="50000"/>
-                      </a:schemeClr>
-                    </a:solidFill>
-                  </a:tcPr>
-                </a:tc>
               </a:tr>
               <a:tr h="381000">
                 <a:tc>
@@ -13306,30 +12005,6 @@
                     </a:solidFill>
                   </a:tcPr>
                 </a:tc>
-                <a:tc>
-                  <a:txBody>
-                    <a:bodyPr vert="horz" wrap="square"/>
-                    <a:lstStyle/>
-                    <a:p>
-                      <a:pPr>
-                        <a:buNone/>
-                      </a:pPr>
-                      <a:r>
-                        <a:rPr lang="en-GB" sz="1200" b="0">
-                          <a:solidFill>
-                            <a:schemeClr val="bg1"/>
-                          </a:solidFill>
-                        </a:rPr>
-                        <a:t>(503) 555-0117</a:t>
-                      </a:r>
-                    </a:p>
-                  </a:txBody>
-                  <a:tcPr>
-                    <a:solidFill>
-                      <a:srgbClr val="666666"/>
-                    </a:solidFill>
-                  </a:tcPr>
-                </a:tc>
               </a:tr>
               <a:tr h="381000">
                 <a:tc>
@@ -13488,32 +12163,6 @@
                     </a:solidFill>
                   </a:tcPr>
                 </a:tc>
-                <a:tc>
-                  <a:txBody>
-                    <a:bodyPr vert="horz" wrap="square"/>
-                    <a:lstStyle/>
-                    <a:p>
-                      <a:pPr>
-                        <a:buNone/>
-                      </a:pPr>
-                      <a:r>
-                        <a:rPr lang="en-GB" sz="1200" b="0">
-                          <a:solidFill>
-                            <a:schemeClr val="bg1"/>
-                          </a:solidFill>
-                        </a:rPr>
-                        <a:t>035-345678</a:t>
-                      </a:r>
-                    </a:p>
-                  </a:txBody>
-                  <a:tcPr>
-                    <a:solidFill>
-                      <a:schemeClr val="bg1">
-                        <a:lumMod val="50000"/>
-                      </a:schemeClr>
-                    </a:solidFill>
-                  </a:tcPr>
-                </a:tc>
               </a:tr>
               <a:tr h="381000">
                 <a:tc>
@@ -13660,30 +12309,6 @@
                     </a:solidFill>
                   </a:tcPr>
                 </a:tc>
-                <a:tc>
-                  <a:txBody>
-                    <a:bodyPr vert="horz" wrap="square"/>
-                    <a:lstStyle/>
-                    <a:p>
-                      <a:pPr>
-                        <a:buNone/>
-                      </a:pPr>
-                      <a:r>
-                        <a:rPr lang="en-GB" sz="1200" b="0">
-                          <a:solidFill>
-                            <a:schemeClr val="bg1"/>
-                          </a:solidFill>
-                        </a:rPr>
-                        <a:t>(02) 890 12 34</a:t>
-                      </a:r>
-                    </a:p>
-                  </a:txBody>
-                  <a:tcPr>
-                    <a:solidFill>
-                      <a:srgbClr val="666666"/>
-                    </a:solidFill>
-                  </a:tcPr>
-                </a:tc>
               </a:tr>
               <a:tr h="381000">
                 <a:tc>
@@ -13842,32 +12467,6 @@
                     </a:solidFill>
                   </a:tcPr>
                 </a:tc>
-                <a:tc>
-                  <a:txBody>
-                    <a:bodyPr vert="horz" wrap="square"/>
-                    <a:lstStyle/>
-                    <a:p>
-                      <a:pPr>
-                        <a:buNone/>
-                      </a:pPr>
-                      <a:r>
-                        <a:rPr lang="en-GB" sz="1200" b="0">
-                          <a:solidFill>
-                            <a:schemeClr val="bg1"/>
-                          </a:solidFill>
-                        </a:rPr>
-                        <a:t>(514) 345-6789</a:t>
-                      </a:r>
-                    </a:p>
-                  </a:txBody>
-                  <a:tcPr>
-                    <a:solidFill>
-                      <a:schemeClr val="bg1">
-                        <a:lumMod val="50000"/>
-                      </a:schemeClr>
-                    </a:solidFill>
-                  </a:tcPr>
-                </a:tc>
               </a:tr>
               <a:tr h="381000">
                 <a:tc>
@@ -14014,30 +12613,6 @@
                     </a:solidFill>
                   </a:tcPr>
                 </a:tc>
-                <a:tc>
-                  <a:txBody>
-                    <a:bodyPr vert="horz" wrap="square"/>
-                    <a:lstStyle/>
-                    <a:p>
-                      <a:pPr>
-                        <a:buNone/>
-                      </a:pPr>
-                      <a:r>
-                        <a:rPr lang="en-GB" sz="1200" b="0">
-                          <a:solidFill>
-                            <a:schemeClr val="bg1"/>
-                          </a:solidFill>
-                        </a:rPr>
-                        <a:t>0342-12345</a:t>
-                      </a:r>
-                    </a:p>
-                  </a:txBody>
-                  <a:tcPr>
-                    <a:solidFill>
-                      <a:srgbClr val="666666"/>
-                    </a:solidFill>
-                  </a:tcPr>
-                </a:tc>
               </a:tr>
               <a:tr h="381000">
                 <a:tc>
@@ -14196,32 +12771,6 @@
                     </a:solidFill>
                   </a:tcPr>
                 </a:tc>
-                <a:tc>
-                  <a:txBody>
-                    <a:bodyPr vert="horz" wrap="square"/>
-                    <a:lstStyle/>
-                    <a:p>
-                      <a:pPr>
-                        <a:buNone/>
-                      </a:pPr>
-                      <a:r>
-                        <a:rPr lang="en-GB" sz="1200" b="0">
-                          <a:solidFill>
-                            <a:schemeClr val="bg1"/>
-                          </a:solidFill>
-                        </a:rPr>
-                        <a:t>(171) 890-1234</a:t>
-                      </a:r>
-                    </a:p>
-                  </a:txBody>
-                  <a:tcPr>
-                    <a:solidFill>
-                      <a:schemeClr val="bg1">
-                        <a:lumMod val="50000"/>
-                      </a:schemeClr>
-                    </a:solidFill>
-                  </a:tcPr>
-                </a:tc>
               </a:tr>
               <a:tr h="381000">
                 <a:tc>
@@ -14368,30 +12917,6 @@
                     </a:solidFill>
                   </a:tcPr>
                 </a:tc>
-                <a:tc>
-                  <a:txBody>
-                    <a:bodyPr vert="horz" wrap="square"/>
-                    <a:lstStyle/>
-                    <a:p>
-                      <a:pPr>
-                        <a:buNone/>
-                      </a:pPr>
-                      <a:r>
-                        <a:rPr lang="en-GB" sz="1200" b="0">
-                          <a:solidFill>
-                            <a:schemeClr val="bg1"/>
-                          </a:solidFill>
-                        </a:rPr>
-                        <a:t>(1) 123-4567</a:t>
-                      </a:r>
-                    </a:p>
-                  </a:txBody>
-                  <a:tcPr>
-                    <a:solidFill>
-                      <a:srgbClr val="666666"/>
-                    </a:solidFill>
-                  </a:tcPr>
-                </a:tc>
               </a:tr>
               <a:tr h="381000">
                 <a:tc>
@@ -14539,32 +13064,6 @@
                           </a:solidFill>
                         </a:rPr>
                         <a:t>USA</a:t>
-                      </a:r>
-                    </a:p>
-                  </a:txBody>
-                  <a:tcPr>
-                    <a:solidFill>
-                      <a:schemeClr val="bg1">
-                        <a:lumMod val="50000"/>
-                      </a:schemeClr>
-                    </a:solidFill>
-                  </a:tcPr>
-                </a:tc>
-                <a:tc>
-                  <a:txBody>
-                    <a:bodyPr vert="horz" wrap="square"/>
-                    <a:lstStyle/>
-                    <a:p>
-                      <a:pPr>
-                        <a:buNone/>
-                      </a:pPr>
-                      <a:r>
-                        <a:rPr lang="en-GB" sz="1200" b="0">
-                          <a:solidFill>
-                            <a:schemeClr val="bg1"/>
-                          </a:solidFill>
-                        </a:rPr>
-                        <a:t>(907) 555-0115</a:t>
                       </a:r>
                     </a:p>
                   </a:txBody>
@@ -14796,7 +13295,7 @@
         </p:nvGraphicFramePr>
         <p:xfrm>
           <a:off x="395605" y="549275"/>
-          <a:ext cx="8343265" cy="5691505"/>
+          <a:ext cx="7151370" cy="5691505"/>
         </p:xfrm>
         <a:graphic>
           <a:graphicData uri="http://schemas.openxmlformats.org/drawingml/2006/table">
@@ -14811,7 +13310,6 @@
                 <a:gridCol w="1191895"/>
                 <a:gridCol w="1191895"/>
                 <a:gridCol w="1191895"/>
-                <a:gridCol w="1191895"/>
               </a:tblGrid>
               <a:tr h="372745">
                 <a:tc>
@@ -14958,30 +13456,6 @@
                     </a:solidFill>
                   </a:tcPr>
                 </a:tc>
-                <a:tc>
-                  <a:txBody>
-                    <a:bodyPr vert="horz" wrap="square"/>
-                    <a:lstStyle/>
-                    <a:p>
-                      <a:pPr>
-                        <a:buNone/>
-                      </a:pPr>
-                      <a:r>
-                        <a:rPr lang="en-GB" sz="1200">
-                          <a:solidFill>
-                            <a:schemeClr val="bg1"/>
-                          </a:solidFill>
-                        </a:rPr>
-                        <a:t>Phone</a:t>
-                      </a:r>
-                    </a:p>
-                  </a:txBody>
-                  <a:tcPr>
-                    <a:solidFill>
-                      <a:srgbClr val="666666"/>
-                    </a:solidFill>
-                  </a:tcPr>
-                </a:tc>
               </a:tr>
               <a:tr h="381000">
                 <a:tc>
@@ -15128,30 +13602,6 @@
                     </a:solidFill>
                   </a:tcPr>
                 </a:tc>
-                <a:tc>
-                  <a:txBody>
-                    <a:bodyPr vert="horz" wrap="square"/>
-                    <a:lstStyle/>
-                    <a:p>
-                      <a:pPr>
-                        <a:buNone/>
-                      </a:pPr>
-                      <a:r>
-                        <a:rPr lang="en-GB" sz="1200" b="0">
-                          <a:solidFill>
-                            <a:schemeClr val="bg1"/>
-                          </a:solidFill>
-                        </a:rPr>
-                        <a:t>0221-0123456</a:t>
-                      </a:r>
-                    </a:p>
-                  </a:txBody>
-                  <a:tcPr>
-                    <a:solidFill>
-                      <a:srgbClr val="666666"/>
-                    </a:solidFill>
-                  </a:tcPr>
-                </a:tc>
               </a:tr>
               <a:tr h="381000">
                 <a:tc>
@@ -15310,32 +13760,6 @@
                     </a:solidFill>
                   </a:tcPr>
                 </a:tc>
-                <a:tc>
-                  <a:txBody>
-                    <a:bodyPr vert="horz" wrap="square"/>
-                    <a:lstStyle/>
-                    <a:p>
-                      <a:pPr>
-                        <a:buNone/>
-                      </a:pPr>
-                      <a:r>
-                        <a:rPr lang="en-GB" sz="1200" b="0">
-                          <a:solidFill>
-                            <a:schemeClr val="bg1"/>
-                          </a:solidFill>
-                        </a:rPr>
-                        <a:t>(1) 89.01.23.45</a:t>
-                      </a:r>
-                    </a:p>
-                  </a:txBody>
-                  <a:tcPr>
-                    <a:solidFill>
-                      <a:schemeClr val="bg1">
-                        <a:lumMod val="50000"/>
-                      </a:schemeClr>
-                    </a:solidFill>
-                  </a:tcPr>
-                </a:tc>
               </a:tr>
               <a:tr h="381000">
                 <a:tc>
@@ -15482,30 +13906,6 @@
                     </a:solidFill>
                   </a:tcPr>
                 </a:tc>
-                <a:tc>
-                  <a:txBody>
-                    <a:bodyPr vert="horz" wrap="square"/>
-                    <a:lstStyle/>
-                    <a:p>
-                      <a:pPr>
-                        <a:buNone/>
-                      </a:pPr>
-                      <a:r>
-                        <a:rPr lang="en-GB" sz="1200" b="0">
-                          <a:solidFill>
-                            <a:schemeClr val="bg1"/>
-                          </a:solidFill>
-                        </a:rPr>
-                        <a:t>(5) 890-1234</a:t>
-                      </a:r>
-                    </a:p>
-                  </a:txBody>
-                  <a:tcPr>
-                    <a:solidFill>
-                      <a:srgbClr val="666666"/>
-                    </a:solidFill>
-                  </a:tcPr>
-                </a:tc>
               </a:tr>
               <a:tr h="381000">
                 <a:tc>
@@ -15664,32 +14064,6 @@
                     </a:solidFill>
                   </a:tcPr>
                 </a:tc>
-                <a:tc>
-                  <a:txBody>
-                    <a:bodyPr vert="horz" wrap="square"/>
-                    <a:lstStyle/>
-                    <a:p>
-                      <a:pPr>
-                        <a:buNone/>
-                      </a:pPr>
-                      <a:r>
-                        <a:rPr lang="en-GB" sz="1200" b="0">
-                          <a:solidFill>
-                            <a:schemeClr val="bg1"/>
-                          </a:solidFill>
-                        </a:rPr>
-                        <a:t>4567-8901</a:t>
-                      </a:r>
-                    </a:p>
-                  </a:txBody>
-                  <a:tcPr>
-                    <a:solidFill>
-                      <a:schemeClr val="bg1">
-                        <a:lumMod val="50000"/>
-                      </a:schemeClr>
-                    </a:solidFill>
-                  </a:tcPr>
-                </a:tc>
               </a:tr>
               <a:tr h="381000">
                 <a:tc>
@@ -15836,30 +14210,6 @@
                     </a:solidFill>
                   </a:tcPr>
                 </a:tc>
-                <a:tc>
-                  <a:txBody>
-                    <a:bodyPr vert="horz" wrap="square"/>
-                    <a:lstStyle/>
-                    <a:p>
-                      <a:pPr>
-                        <a:buNone/>
-                      </a:pPr>
-                      <a:r>
-                        <a:rPr lang="en-GB" sz="1200" b="0">
-                          <a:solidFill>
-                            <a:schemeClr val="bg1"/>
-                          </a:solidFill>
-                        </a:rPr>
-                        <a:t>(1) 789-0123</a:t>
-                      </a:r>
-                    </a:p>
-                  </a:txBody>
-                  <a:tcPr>
-                    <a:solidFill>
-                      <a:srgbClr val="666666"/>
-                    </a:solidFill>
-                  </a:tcPr>
-                </a:tc>
               </a:tr>
               <a:tr h="381000">
                 <a:tc>
@@ -16018,32 +14368,6 @@
                     </a:solidFill>
                   </a:tcPr>
                 </a:tc>
-                <a:tc>
-                  <a:txBody>
-                    <a:bodyPr vert="horz" wrap="square"/>
-                    <a:lstStyle/>
-                    <a:p>
-                      <a:pPr>
-                        <a:buNone/>
-                      </a:pPr>
-                      <a:r>
-                        <a:rPr lang="en-GB" sz="1200" b="0">
-                          <a:solidFill>
-                            <a:schemeClr val="bg1"/>
-                          </a:solidFill>
-                        </a:rPr>
-                        <a:t>(21) 678-9012</a:t>
-                      </a:r>
-                    </a:p>
-                  </a:txBody>
-                  <a:tcPr>
-                    <a:solidFill>
-                      <a:schemeClr val="bg1">
-                        <a:lumMod val="50000"/>
-                      </a:schemeClr>
-                    </a:solidFill>
-                  </a:tcPr>
-                </a:tc>
               </a:tr>
               <a:tr h="381000">
                 <a:tc>
@@ -16190,30 +14514,6 @@
                     </a:solidFill>
                   </a:tcPr>
                 </a:tc>
-                <a:tc>
-                  <a:txBody>
-                    <a:bodyPr vert="horz" wrap="square"/>
-                    <a:lstStyle/>
-                    <a:p>
-                      <a:pPr>
-                        <a:buNone/>
-                      </a:pPr>
-                      <a:r>
-                        <a:rPr lang="en-GB" sz="1200" b="0">
-                          <a:solidFill>
-                            <a:schemeClr val="bg1"/>
-                          </a:solidFill>
-                        </a:rPr>
-                        <a:t>(11) 901-2345</a:t>
-                      </a:r>
-                    </a:p>
-                  </a:txBody>
-                  <a:tcPr>
-                    <a:solidFill>
-                      <a:srgbClr val="666666"/>
-                    </a:solidFill>
-                  </a:tcPr>
-                </a:tc>
               </a:tr>
               <a:tr h="381000">
                 <a:tc>
@@ -16372,32 +14672,6 @@
                     </a:solidFill>
                   </a:tcPr>
                 </a:tc>
-                <a:tc>
-                  <a:txBody>
-                    <a:bodyPr vert="horz" wrap="square"/>
-                    <a:lstStyle/>
-                    <a:p>
-                      <a:pPr>
-                        <a:buNone/>
-                      </a:pPr>
-                      <a:r>
-                        <a:rPr lang="en-GB" sz="1200" b="0">
-                          <a:solidFill>
-                            <a:schemeClr val="bg1"/>
-                          </a:solidFill>
-                        </a:rPr>
-                        <a:t>0372-12345</a:t>
-                      </a:r>
-                    </a:p>
-                  </a:txBody>
-                  <a:tcPr>
-                    <a:solidFill>
-                      <a:schemeClr val="bg1">
-                        <a:lumMod val="50000"/>
-                      </a:schemeClr>
-                    </a:solidFill>
-                  </a:tcPr>
-                </a:tc>
               </a:tr>
               <a:tr h="381000">
                 <a:tc>
@@ -16544,30 +14818,6 @@
                     </a:solidFill>
                   </a:tcPr>
                 </a:tc>
-                <a:tc>
-                  <a:txBody>
-                    <a:bodyPr vert="horz" wrap="square"/>
-                    <a:lstStyle/>
-                    <a:p>
-                      <a:pPr>
-                        <a:buNone/>
-                      </a:pPr>
-                      <a:r>
-                        <a:rPr lang="en-GB" sz="1200" b="0">
-                          <a:solidFill>
-                            <a:schemeClr val="bg1"/>
-                          </a:solidFill>
-                        </a:rPr>
-                        <a:t>(1) 234-5678</a:t>
-                      </a:r>
-                    </a:p>
-                  </a:txBody>
-                  <a:tcPr>
-                    <a:solidFill>
-                      <a:srgbClr val="666666"/>
-                    </a:solidFill>
-                  </a:tcPr>
-                </a:tc>
               </a:tr>
               <a:tr h="381000">
                 <a:tc>
@@ -16726,32 +14976,6 @@
                     </a:solidFill>
                   </a:tcPr>
                 </a:tc>
-                <a:tc>
-                  <a:txBody>
-                    <a:bodyPr vert="horz" wrap="square"/>
-                    <a:lstStyle/>
-                    <a:p>
-                      <a:pPr>
-                        <a:buNone/>
-                      </a:pPr>
-                      <a:r>
-                        <a:rPr lang="en-GB" sz="1200" b="0">
-                          <a:solidFill>
-                            <a:schemeClr val="bg1"/>
-                          </a:solidFill>
-                        </a:rPr>
-                        <a:t>(505) 555-0125</a:t>
-                      </a:r>
-                    </a:p>
-                  </a:txBody>
-                  <a:tcPr>
-                    <a:solidFill>
-                      <a:schemeClr val="bg1">
-                        <a:lumMod val="50000"/>
-                      </a:schemeClr>
-                    </a:solidFill>
-                  </a:tcPr>
-                </a:tc>
               </a:tr>
               <a:tr h="381000">
                 <a:tc>
@@ -16889,30 +15113,6 @@
                           </a:solidFill>
                         </a:rPr>
                         <a:t>Italy</a:t>
-                      </a:r>
-                    </a:p>
-                  </a:txBody>
-                  <a:tcPr>
-                    <a:solidFill>
-                      <a:srgbClr val="666666"/>
-                    </a:solidFill>
-                  </a:tcPr>
-                </a:tc>
-                <a:tc>
-                  <a:txBody>
-                    <a:bodyPr vert="horz" wrap="square"/>
-                    <a:lstStyle/>
-                    <a:p>
-                      <a:pPr>
-                        <a:buNone/>
-                      </a:pPr>
-                      <a:r>
-                        <a:rPr lang="en-GB" sz="1200" b="0">
-                          <a:solidFill>
-                            <a:schemeClr val="bg1"/>
-                          </a:solidFill>
-                        </a:rPr>
-                        <a:t>0522-012345</a:t>
                       </a:r>
                     </a:p>
                   </a:txBody>
@@ -17142,7 +15342,7 @@
         </p:nvGraphicFramePr>
         <p:xfrm>
           <a:off x="395605" y="549275"/>
-          <a:ext cx="8343265" cy="5584825"/>
+          <a:ext cx="7151370" cy="5584825"/>
         </p:xfrm>
         <a:graphic>
           <a:graphicData uri="http://schemas.openxmlformats.org/drawingml/2006/table">
@@ -17157,7 +15357,6 @@
                 <a:gridCol w="1191895"/>
                 <a:gridCol w="1191895"/>
                 <a:gridCol w="1191895"/>
-                <a:gridCol w="1191895"/>
               </a:tblGrid>
               <a:tr h="372745">
                 <a:tc>
@@ -17304,30 +15503,6 @@
                     </a:solidFill>
                   </a:tcPr>
                 </a:tc>
-                <a:tc>
-                  <a:txBody>
-                    <a:bodyPr vert="horz" wrap="square"/>
-                    <a:lstStyle/>
-                    <a:p>
-                      <a:pPr>
-                        <a:buNone/>
-                      </a:pPr>
-                      <a:r>
-                        <a:rPr lang="en-GB" sz="1200">
-                          <a:solidFill>
-                            <a:schemeClr val="bg1"/>
-                          </a:solidFill>
-                        </a:rPr>
-                        <a:t>Phone</a:t>
-                      </a:r>
-                    </a:p>
-                  </a:txBody>
-                  <a:tcPr>
-                    <a:solidFill>
-                      <a:srgbClr val="666666"/>
-                    </a:solidFill>
-                  </a:tcPr>
-                </a:tc>
               </a:tr>
               <a:tr h="381000">
                 <a:tc>
@@ -17486,32 +15661,6 @@
                     </a:solidFill>
                   </a:tcPr>
                 </a:tc>
-                <a:tc>
-                  <a:txBody>
-                    <a:bodyPr vert="horz" wrap="square"/>
-                    <a:lstStyle/>
-                    <a:p>
-                      <a:pPr>
-                        <a:buNone/>
-                      </a:pPr>
-                      <a:r>
-                        <a:rPr lang="en-GB" sz="1200" b="0">
-                          <a:solidFill>
-                            <a:schemeClr val="bg1"/>
-                          </a:solidFill>
-                        </a:rPr>
-                        <a:t>(21) 345-6789</a:t>
-                      </a:r>
-                    </a:p>
-                  </a:txBody>
-                  <a:tcPr>
-                    <a:solidFill>
-                      <a:schemeClr val="bg1">
-                        <a:lumMod val="50000"/>
-                      </a:schemeClr>
-                    </a:solidFill>
-                  </a:tcPr>
-                </a:tc>
               </a:tr>
               <a:tr h="381000">
                 <a:tc>
@@ -17658,30 +15807,6 @@
                     </a:solidFill>
                   </a:tcPr>
                 </a:tc>
-                <a:tc>
-                  <a:txBody>
-                    <a:bodyPr vert="horz" wrap="square"/>
-                    <a:lstStyle/>
-                    <a:p>
-                      <a:pPr>
-                        <a:buNone/>
-                      </a:pPr>
-                      <a:r>
-                        <a:rPr lang="en-GB" sz="1200" b="0">
-                          <a:solidFill>
-                            <a:schemeClr val="bg1"/>
-                          </a:solidFill>
-                        </a:rPr>
-                        <a:t>0897-012345</a:t>
-                      </a:r>
-                    </a:p>
-                  </a:txBody>
-                  <a:tcPr>
-                    <a:solidFill>
-                      <a:srgbClr val="666666"/>
-                    </a:solidFill>
-                  </a:tcPr>
-                </a:tc>
               </a:tr>
               <a:tr h="381000">
                 <a:tc>
@@ -17840,32 +15965,6 @@
                     </a:solidFill>
                   </a:tcPr>
                 </a:tc>
-                <a:tc>
-                  <a:txBody>
-                    <a:bodyPr vert="horz" wrap="square"/>
-                    <a:lstStyle/>
-                    <a:p>
-                      <a:pPr>
-                        <a:buNone/>
-                      </a:pPr>
-                      <a:r>
-                        <a:rPr lang="en-GB" sz="1200" b="0">
-                          <a:solidFill>
-                            <a:schemeClr val="bg1"/>
-                          </a:solidFill>
-                        </a:rPr>
-                        <a:t>(91) 567 8901</a:t>
-                      </a:r>
-                    </a:p>
-                  </a:txBody>
-                  <a:tcPr>
-                    <a:solidFill>
-                      <a:schemeClr val="bg1">
-                        <a:lumMod val="50000"/>
-                      </a:schemeClr>
-                    </a:solidFill>
-                  </a:tcPr>
-                </a:tc>
               </a:tr>
               <a:tr h="381000">
                 <a:tc>
@@ -18012,30 +16111,6 @@
                     </a:solidFill>
                   </a:tcPr>
                 </a:tc>
-                <a:tc>
-                  <a:txBody>
-                    <a:bodyPr vert="horz" wrap="square"/>
-                    <a:lstStyle/>
-                    <a:p>
-                      <a:pPr>
-                        <a:buNone/>
-                      </a:pPr>
-                      <a:r>
-                        <a:rPr lang="en-GB" sz="1200" b="0">
-                          <a:solidFill>
-                            <a:schemeClr val="bg1"/>
-                          </a:solidFill>
-                        </a:rPr>
-                        <a:t>07-89 01 23</a:t>
-                      </a:r>
-                    </a:p>
-                  </a:txBody>
-                  <a:tcPr>
-                    <a:solidFill>
-                      <a:srgbClr val="666666"/>
-                    </a:solidFill>
-                  </a:tcPr>
-                </a:tc>
               </a:tr>
               <a:tr h="381000">
                 <a:tc>
@@ -18194,32 +16269,6 @@
                     </a:solidFill>
                   </a:tcPr>
                 </a:tc>
-                <a:tc>
-                  <a:txBody>
-                    <a:bodyPr vert="horz" wrap="square"/>
-                    <a:lstStyle/>
-                    <a:p>
-                      <a:pPr>
-                        <a:buNone/>
-                      </a:pPr>
-                      <a:r>
-                        <a:rPr lang="en-GB" sz="1200" b="0">
-                          <a:solidFill>
-                            <a:schemeClr val="bg1"/>
-                          </a:solidFill>
-                        </a:rPr>
-                        <a:t>(208) 555-0116</a:t>
-                      </a:r>
-                    </a:p>
-                  </a:txBody>
-                  <a:tcPr>
-                    <a:solidFill>
-                      <a:schemeClr val="bg1">
-                        <a:lumMod val="50000"/>
-                      </a:schemeClr>
-                    </a:solidFill>
-                  </a:tcPr>
-                </a:tc>
               </a:tr>
               <a:tr h="381000">
                 <a:tc>
@@ -18366,30 +16415,6 @@
                     </a:solidFill>
                   </a:tcPr>
                 </a:tc>
-                <a:tc>
-                  <a:txBody>
-                    <a:bodyPr vert="horz" wrap="square"/>
-                    <a:lstStyle/>
-                    <a:p>
-                      <a:pPr>
-                        <a:buNone/>
-                      </a:pPr>
-                      <a:r>
-                        <a:rPr lang="en-GB" sz="1200" b="0">
-                          <a:solidFill>
-                            <a:schemeClr val="bg1"/>
-                          </a:solidFill>
-                        </a:rPr>
-                        <a:t>(171) 901-2345</a:t>
-                      </a:r>
-                    </a:p>
-                  </a:txBody>
-                  <a:tcPr>
-                    <a:solidFill>
-                      <a:srgbClr val="666666"/>
-                    </a:solidFill>
-                  </a:tcPr>
-                </a:tc>
               </a:tr>
               <a:tr h="381000">
                 <a:tc>
@@ -18548,32 +16573,6 @@
                     </a:solidFill>
                   </a:tcPr>
                 </a:tc>
-                <a:tc>
-                  <a:txBody>
-                    <a:bodyPr vert="horz" wrap="square"/>
-                    <a:lstStyle/>
-                    <a:p>
-                      <a:pPr>
-                        <a:buNone/>
-                      </a:pPr>
-                      <a:r>
-                        <a:rPr lang="en-GB" sz="1200" b="0">
-                          <a:solidFill>
-                            <a:schemeClr val="bg1"/>
-                          </a:solidFill>
-                        </a:rPr>
-                        <a:t>12 34 56 78</a:t>
-                      </a:r>
-                    </a:p>
-                  </a:txBody>
-                  <a:tcPr>
-                    <a:solidFill>
-                      <a:schemeClr val="bg1">
-                        <a:lumMod val="50000"/>
-                      </a:schemeClr>
-                    </a:solidFill>
-                  </a:tcPr>
-                </a:tc>
               </a:tr>
               <a:tr h="381000">
                 <a:tc>
@@ -18720,30 +16719,6 @@
                     </a:solidFill>
                   </a:tcPr>
                 </a:tc>
-                <a:tc>
-                  <a:txBody>
-                    <a:bodyPr vert="horz" wrap="square"/>
-                    <a:lstStyle/>
-                    <a:p>
-                      <a:pPr>
-                        <a:buNone/>
-                      </a:pPr>
-                      <a:r>
-                        <a:rPr lang="en-GB" sz="1200" b="0">
-                          <a:solidFill>
-                            <a:schemeClr val="bg1"/>
-                          </a:solidFill>
-                        </a:rPr>
-                        <a:t>(1) 23.45.67.89</a:t>
-                      </a:r>
-                    </a:p>
-                  </a:txBody>
-                  <a:tcPr>
-                    <a:solidFill>
-                      <a:srgbClr val="666666"/>
-                    </a:solidFill>
-                  </a:tcPr>
-                </a:tc>
               </a:tr>
               <a:tr h="381000">
                 <a:tc>
@@ -18902,32 +16877,6 @@
                     </a:solidFill>
                   </a:tcPr>
                 </a:tc>
-                <a:tc>
-                  <a:txBody>
-                    <a:bodyPr vert="horz" wrap="square"/>
-                    <a:lstStyle/>
-                    <a:p>
-                      <a:pPr>
-                        <a:buNone/>
-                      </a:pPr>
-                      <a:r>
-                        <a:rPr lang="en-GB" sz="1200" b="0">
-                          <a:solidFill>
-                            <a:schemeClr val="bg1"/>
-                          </a:solidFill>
-                        </a:rPr>
-                        <a:t>(307) 555-0114</a:t>
-                      </a:r>
-                    </a:p>
-                  </a:txBody>
-                  <a:tcPr>
-                    <a:solidFill>
-                      <a:schemeClr val="bg1">
-                        <a:lumMod val="50000"/>
-                      </a:schemeClr>
-                    </a:solidFill>
-                  </a:tcPr>
-                </a:tc>
               </a:tr>
               <a:tr h="381000">
                 <a:tc>
@@ -19074,30 +17023,6 @@
                     </a:solidFill>
                   </a:tcPr>
                 </a:tc>
-                <a:tc>
-                  <a:txBody>
-                    <a:bodyPr vert="horz" wrap="square"/>
-                    <a:lstStyle/>
-                    <a:p>
-                      <a:pPr>
-                        <a:buNone/>
-                      </a:pPr>
-                      <a:r>
-                        <a:rPr lang="en-GB" sz="1200" b="0">
-                          <a:solidFill>
-                            <a:schemeClr val="bg1"/>
-                          </a:solidFill>
-                        </a:rPr>
-                        <a:t>(071) 56 78 90 12</a:t>
-                      </a:r>
-                    </a:p>
-                  </a:txBody>
-                  <a:tcPr>
-                    <a:solidFill>
-                      <a:srgbClr val="666666"/>
-                    </a:solidFill>
-                  </a:tcPr>
-                </a:tc>
               </a:tr>
               <a:tr h="381000">
                 <a:tc>
@@ -19245,32 +17170,6 @@
                           </a:solidFill>
                         </a:rPr>
                         <a:t>USA</a:t>
-                      </a:r>
-                    </a:p>
-                  </a:txBody>
-                  <a:tcPr>
-                    <a:solidFill>
-                      <a:schemeClr val="bg1">
-                        <a:lumMod val="50000"/>
-                      </a:schemeClr>
-                    </a:solidFill>
-                  </a:tcPr>
-                </a:tc>
-                <a:tc>
-                  <a:txBody>
-                    <a:bodyPr vert="horz" wrap="square"/>
-                    <a:lstStyle/>
-                    <a:p>
-                      <a:pPr>
-                        <a:buNone/>
-                      </a:pPr>
-                      <a:r>
-                        <a:rPr lang="en-GB" sz="1200" b="0">
-                          <a:solidFill>
-                            <a:schemeClr val="bg1"/>
-                          </a:solidFill>
-                        </a:rPr>
-                        <a:t>(503) 555-0120</a:t>
                       </a:r>
                     </a:p>
                   </a:txBody>
@@ -19502,7 +17401,7 @@
         </p:nvGraphicFramePr>
         <p:xfrm>
           <a:off x="395605" y="549275"/>
-          <a:ext cx="8343265" cy="5401945"/>
+          <a:ext cx="7151370" cy="5401945"/>
         </p:xfrm>
         <a:graphic>
           <a:graphicData uri="http://schemas.openxmlformats.org/drawingml/2006/table">
@@ -19517,7 +17416,6 @@
                 <a:gridCol w="1191895"/>
                 <a:gridCol w="1191895"/>
                 <a:gridCol w="1191895"/>
-                <a:gridCol w="1191895"/>
               </a:tblGrid>
               <a:tr h="372745">
                 <a:tc>
@@ -19664,30 +17562,6 @@
                     </a:solidFill>
                   </a:tcPr>
                 </a:tc>
-                <a:tc>
-                  <a:txBody>
-                    <a:bodyPr vert="horz" wrap="square"/>
-                    <a:lstStyle/>
-                    <a:p>
-                      <a:pPr>
-                        <a:buNone/>
-                      </a:pPr>
-                      <a:r>
-                        <a:rPr lang="en-GB" sz="1200">
-                          <a:solidFill>
-                            <a:schemeClr val="bg1"/>
-                          </a:solidFill>
-                        </a:rPr>
-                        <a:t>Phone</a:t>
-                      </a:r>
-                    </a:p>
-                  </a:txBody>
-                  <a:tcPr>
-                    <a:solidFill>
-                      <a:srgbClr val="666666"/>
-                    </a:solidFill>
-                  </a:tcPr>
-                </a:tc>
               </a:tr>
               <a:tr h="381000">
                 <a:tc>
@@ -19834,30 +17708,6 @@
                     </a:solidFill>
                   </a:tcPr>
                 </a:tc>
-                <a:tc>
-                  <a:txBody>
-                    <a:bodyPr vert="horz" wrap="square"/>
-                    <a:lstStyle/>
-                    <a:p>
-                      <a:pPr>
-                        <a:buNone/>
-                      </a:pPr>
-                      <a:r>
-                        <a:rPr lang="en-GB" sz="1200" b="0">
-                          <a:solidFill>
-                            <a:schemeClr val="bg1"/>
-                          </a:solidFill>
-                        </a:rPr>
-                        <a:t>(406) 555-0121</a:t>
-                      </a:r>
-                    </a:p>
-                  </a:txBody>
-                  <a:tcPr>
-                    <a:solidFill>
-                      <a:srgbClr val="666666"/>
-                    </a:solidFill>
-                  </a:tcPr>
-                </a:tc>
               </a:tr>
               <a:tr h="381000">
                 <a:tc>
@@ -20016,32 +17866,6 @@
                     </a:solidFill>
                   </a:tcPr>
                 </a:tc>
-                <a:tc>
-                  <a:txBody>
-                    <a:bodyPr vert="horz" wrap="square"/>
-                    <a:lstStyle/>
-                    <a:p>
-                      <a:pPr>
-                        <a:buNone/>
-                      </a:pPr>
-                      <a:r>
-                        <a:rPr lang="en-GB" sz="1200" b="0">
-                          <a:solidFill>
-                            <a:schemeClr val="bg1"/>
-                          </a:solidFill>
-                        </a:rPr>
-                        <a:t>0251-456789</a:t>
-                      </a:r>
-                    </a:p>
-                  </a:txBody>
-                  <a:tcPr>
-                    <a:solidFill>
-                      <a:schemeClr val="bg1">
-                        <a:lumMod val="50000"/>
-                      </a:schemeClr>
-                    </a:solidFill>
-                  </a:tcPr>
-                </a:tc>
               </a:tr>
               <a:tr h="381000">
                 <a:tc>
@@ -20188,30 +18012,6 @@
                     </a:solidFill>
                   </a:tcPr>
                 </a:tc>
-                <a:tc>
-                  <a:txBody>
-                    <a:bodyPr vert="horz" wrap="square"/>
-                    <a:lstStyle/>
-                    <a:p>
-                      <a:pPr>
-                        <a:buNone/>
-                      </a:pPr>
-                      <a:r>
-                        <a:rPr lang="en-GB" sz="1200" b="0">
-                          <a:solidFill>
-                            <a:schemeClr val="bg1"/>
-                          </a:solidFill>
-                        </a:rPr>
-                        <a:t>(5) 678-9012</a:t>
-                      </a:r>
-                    </a:p>
-                  </a:txBody>
-                  <a:tcPr>
-                    <a:solidFill>
-                      <a:srgbClr val="666666"/>
-                    </a:solidFill>
-                  </a:tcPr>
-                </a:tc>
               </a:tr>
               <a:tr h="381000">
                 <a:tc>
@@ -20370,32 +18170,6 @@
                     </a:solidFill>
                   </a:tcPr>
                 </a:tc>
-                <a:tc>
-                  <a:txBody>
-                    <a:bodyPr vert="horz" wrap="square"/>
-                    <a:lstStyle/>
-                    <a:p>
-                      <a:pPr>
-                        <a:buNone/>
-                      </a:pPr>
-                      <a:r>
-                        <a:rPr lang="en-GB" sz="1200" b="0">
-                          <a:solidFill>
-                            <a:schemeClr val="bg1"/>
-                          </a:solidFill>
-                        </a:rPr>
-                        <a:t>(11) 123-4567</a:t>
-                      </a:r>
-                    </a:p>
-                  </a:txBody>
-                  <a:tcPr>
-                    <a:solidFill>
-                      <a:schemeClr val="bg1">
-                        <a:lumMod val="50000"/>
-                      </a:schemeClr>
-                    </a:solidFill>
-                  </a:tcPr>
-                </a:tc>
               </a:tr>
               <a:tr h="381000">
                 <a:tc>
@@ -20542,30 +18316,6 @@
                     </a:solidFill>
                   </a:tcPr>
                 </a:tc>
-                <a:tc>
-                  <a:txBody>
-                    <a:bodyPr vert="horz" wrap="square"/>
-                    <a:lstStyle/>
-                    <a:p>
-                      <a:pPr>
-                        <a:buNone/>
-                      </a:pPr>
-                      <a:r>
-                        <a:rPr lang="en-GB" sz="1200" b="0">
-                          <a:solidFill>
-                            <a:schemeClr val="bg1"/>
-                          </a:solidFill>
-                        </a:rPr>
-                        <a:t>(206) 555-0124</a:t>
-                      </a:r>
-                    </a:p>
-                  </a:txBody>
-                  <a:tcPr>
-                    <a:solidFill>
-                      <a:srgbClr val="666666"/>
-                    </a:solidFill>
-                  </a:tcPr>
-                </a:tc>
               </a:tr>
               <a:tr h="381000">
                 <a:tc>
@@ -20724,32 +18474,6 @@
                     </a:solidFill>
                   </a:tcPr>
                 </a:tc>
-                <a:tc>
-                  <a:txBody>
-                    <a:bodyPr vert="horz" wrap="square"/>
-                    <a:lstStyle/>
-                    <a:p>
-                      <a:pPr>
-                        <a:buNone/>
-                      </a:pPr>
-                      <a:r>
-                        <a:rPr lang="en-GB" sz="1200" b="0">
-                          <a:solidFill>
-                            <a:schemeClr val="bg1"/>
-                          </a:solidFill>
-                        </a:rPr>
-                        <a:t>23 45 67 89</a:t>
-                      </a:r>
-                    </a:p>
-                  </a:txBody>
-                  <a:tcPr>
-                    <a:solidFill>
-                      <a:schemeClr val="bg1">
-                        <a:lumMod val="50000"/>
-                      </a:schemeClr>
-                    </a:solidFill>
-                  </a:tcPr>
-                </a:tc>
               </a:tr>
               <a:tr h="381000">
                 <a:tc>
@@ -20896,30 +18620,6 @@
                     </a:solidFill>
                   </a:tcPr>
                 </a:tc>
-                <a:tc>
-                  <a:txBody>
-                    <a:bodyPr vert="horz" wrap="square"/>
-                    <a:lstStyle/>
-                    <a:p>
-                      <a:pPr>
-                        <a:buNone/>
-                      </a:pPr>
-                      <a:r>
-                        <a:rPr lang="en-GB" sz="1200" b="0">
-                          <a:solidFill>
-                            <a:schemeClr val="bg1"/>
-                          </a:solidFill>
-                        </a:rPr>
-                        <a:t>78.90.12.34</a:t>
-                      </a:r>
-                    </a:p>
-                  </a:txBody>
-                  <a:tcPr>
-                    <a:solidFill>
-                      <a:srgbClr val="666666"/>
-                    </a:solidFill>
-                  </a:tcPr>
-                </a:tc>
               </a:tr>
               <a:tr h="381000">
                 <a:tc>
@@ -21078,32 +18778,6 @@
                     </a:solidFill>
                   </a:tcPr>
                 </a:tc>
-                <a:tc>
-                  <a:txBody>
-                    <a:bodyPr vert="horz" wrap="square"/>
-                    <a:lstStyle/>
-                    <a:p>
-                      <a:pPr>
-                        <a:buNone/>
-                      </a:pPr>
-                      <a:r>
-                        <a:rPr lang="en-GB" sz="1200" b="0">
-                          <a:solidFill>
-                            <a:schemeClr val="bg1"/>
-                          </a:solidFill>
-                        </a:rPr>
-                        <a:t>56.78.90.12</a:t>
-                      </a:r>
-                    </a:p>
-                  </a:txBody>
-                  <a:tcPr>
-                    <a:solidFill>
-                      <a:schemeClr val="bg1">
-                        <a:lumMod val="50000"/>
-                      </a:schemeClr>
-                    </a:solidFill>
-                  </a:tcPr>
-                </a:tc>
               </a:tr>
               <a:tr h="381000">
                 <a:tc>
@@ -21250,30 +18924,6 @@
                     </a:solidFill>
                   </a:tcPr>
                 </a:tc>
-                <a:tc>
-                  <a:txBody>
-                    <a:bodyPr vert="horz" wrap="square"/>
-                    <a:lstStyle/>
-                    <a:p>
-                      <a:pPr>
-                        <a:buNone/>
-                      </a:pPr>
-                      <a:r>
-                        <a:rPr lang="en-GB" sz="1200" b="0">
-                          <a:solidFill>
-                            <a:schemeClr val="bg1"/>
-                          </a:solidFill>
-                        </a:rPr>
-                        <a:t>0711-345678</a:t>
-                      </a:r>
-                    </a:p>
-                  </a:txBody>
-                  <a:tcPr>
-                    <a:solidFill>
-                      <a:srgbClr val="666666"/>
-                    </a:solidFill>
-                  </a:tcPr>
-                </a:tc>
               </a:tr>
               <a:tr h="381000">
                 <a:tc>
@@ -21432,32 +19082,6 @@
                     </a:solidFill>
                   </a:tcPr>
                 </a:tc>
-                <a:tc>
-                  <a:txBody>
-                    <a:bodyPr vert="horz" wrap="square"/>
-                    <a:lstStyle/>
-                    <a:p>
-                      <a:pPr>
-                        <a:buNone/>
-                      </a:pPr>
-                      <a:r>
-                        <a:rPr lang="en-GB" sz="1200" b="0">
-                          <a:solidFill>
-                            <a:schemeClr val="bg1"/>
-                          </a:solidFill>
-                        </a:rPr>
-                        <a:t>981-123456</a:t>
-                      </a:r>
-                    </a:p>
-                  </a:txBody>
-                  <a:tcPr>
-                    <a:solidFill>
-                      <a:schemeClr val="bg1">
-                        <a:lumMod val="50000"/>
-                      </a:schemeClr>
-                    </a:solidFill>
-                  </a:tcPr>
-                </a:tc>
               </a:tr>
               <a:tr h="381000">
                 <a:tc>
@@ -21595,30 +19219,6 @@
                           </a:solidFill>
                         </a:rPr>
                         <a:t>Brazil</a:t>
-                      </a:r>
-                    </a:p>
-                  </a:txBody>
-                  <a:tcPr>
-                    <a:solidFill>
-                      <a:srgbClr val="666666"/>
-                    </a:solidFill>
-                  </a:tcPr>
-                </a:tc>
-                <a:tc>
-                  <a:txBody>
-                    <a:bodyPr vert="horz" wrap="square"/>
-                    <a:lstStyle/>
-                    <a:p>
-                      <a:pPr>
-                        <a:buNone/>
-                      </a:pPr>
-                      <a:r>
-                        <a:rPr lang="en-GB" sz="1200" b="0">
-                          <a:solidFill>
-                            <a:schemeClr val="bg1"/>
-                          </a:solidFill>
-                        </a:rPr>
-                        <a:t>(14) 234-5678</a:t>
                       </a:r>
                     </a:p>
                   </a:txBody>
@@ -21848,7 +19448,7 @@
         </p:nvGraphicFramePr>
         <p:xfrm>
           <a:off x="395605" y="549275"/>
-          <a:ext cx="8343265" cy="4792345"/>
+          <a:ext cx="7151370" cy="4792345"/>
         </p:xfrm>
         <a:graphic>
           <a:graphicData uri="http://schemas.openxmlformats.org/drawingml/2006/table">
@@ -21863,7 +19463,6 @@
                 <a:gridCol w="1191895"/>
                 <a:gridCol w="1191895"/>
                 <a:gridCol w="1191895"/>
-                <a:gridCol w="1191895"/>
               </a:tblGrid>
               <a:tr h="372745">
                 <a:tc>
@@ -22010,30 +19609,6 @@
                     </a:solidFill>
                   </a:tcPr>
                 </a:tc>
-                <a:tc>
-                  <a:txBody>
-                    <a:bodyPr vert="horz" wrap="square"/>
-                    <a:lstStyle/>
-                    <a:p>
-                      <a:pPr>
-                        <a:buNone/>
-                      </a:pPr>
-                      <a:r>
-                        <a:rPr lang="en-GB" sz="1200">
-                          <a:solidFill>
-                            <a:schemeClr val="bg1"/>
-                          </a:solidFill>
-                        </a:rPr>
-                        <a:t>Phone</a:t>
-                      </a:r>
-                    </a:p>
-                  </a:txBody>
-                  <a:tcPr>
-                    <a:solidFill>
-                      <a:srgbClr val="666666"/>
-                    </a:solidFill>
-                  </a:tcPr>
-                </a:tc>
               </a:tr>
               <a:tr h="381000">
                 <a:tc>
@@ -22192,32 +19767,6 @@
                     </a:solidFill>
                   </a:tcPr>
                 </a:tc>
-                <a:tc>
-                  <a:txBody>
-                    <a:bodyPr vert="horz" wrap="square"/>
-                    <a:lstStyle/>
-                    <a:p>
-                      <a:pPr>
-                        <a:buNone/>
-                      </a:pPr>
-                      <a:r>
-                        <a:rPr lang="en-GB" sz="1200" b="0">
-                          <a:solidFill>
-                            <a:schemeClr val="bg1"/>
-                          </a:solidFill>
-                        </a:rPr>
-                        <a:t>(206) 555-0123</a:t>
-                      </a:r>
-                    </a:p>
-                  </a:txBody>
-                  <a:tcPr>
-                    <a:solidFill>
-                      <a:schemeClr val="bg1">
-                        <a:lumMod val="50000"/>
-                      </a:schemeClr>
-                    </a:solidFill>
-                  </a:tcPr>
-                </a:tc>
               </a:tr>
               <a:tr h="381000">
                 <a:tc>
@@ -22364,30 +19913,6 @@
                     </a:solidFill>
                   </a:tcPr>
                 </a:tc>
-                <a:tc>
-                  <a:txBody>
-                    <a:bodyPr vert="horz" wrap="square"/>
-                    <a:lstStyle/>
-                    <a:p>
-                      <a:pPr>
-                        <a:buNone/>
-                      </a:pPr>
-                      <a:r>
-                        <a:rPr lang="en-GB" sz="1200" b="0">
-                          <a:solidFill>
-                            <a:schemeClr val="bg1"/>
-                          </a:solidFill>
-                        </a:rPr>
-                        <a:t>90-012 3456</a:t>
-                      </a:r>
-                    </a:p>
-                  </a:txBody>
-                  <a:tcPr>
-                    <a:solidFill>
-                      <a:srgbClr val="666666"/>
-                    </a:solidFill>
-                  </a:tcPr>
-                </a:tc>
               </a:tr>
               <a:tr h="381000">
                 <a:tc>
@@ -22535,32 +20060,6 @@
                           </a:solidFill>
                         </a:rPr>
                         <a:t>Poland</a:t>
-                      </a:r>
-                    </a:p>
-                  </a:txBody>
-                  <a:tcPr>
-                    <a:solidFill>
-                      <a:schemeClr val="bg1">
-                        <a:lumMod val="50000"/>
-                      </a:schemeClr>
-                    </a:solidFill>
-                  </a:tcPr>
-                </a:tc>
-                <a:tc>
-                  <a:txBody>
-                    <a:bodyPr vert="horz" wrap="square"/>
-                    <a:lstStyle/>
-                    <a:p>
-                      <a:pPr>
-                        <a:buNone/>
-                      </a:pPr>
-                      <a:r>
-                        <a:rPr lang="en-GB" sz="1200" b="0">
-                          <a:solidFill>
-                            <a:schemeClr val="bg1"/>
-                          </a:solidFill>
-                        </a:rPr>
-                        <a:t>(26) 234-5678</a:t>
                       </a:r>
                     </a:p>
                   </a:txBody>
@@ -22712,6 +20211,8 @@
                     </a:solidFill>
                   </a:tcPr>
                 </a:tc>
+              </a:tr>
+              <a:tr h="381000">
                 <a:tc>
                   <a:txBody>
                     <a:bodyPr vert="horz" wrap="square"/>
@@ -22735,8 +20236,6 @@
                     </a:solidFill>
                   </a:tcPr>
                 </a:tc>
-              </a:tr>
-              <a:tr h="381000">
                 <a:tc>
                   <a:txBody>
                     <a:bodyPr vert="horz" wrap="square"/>
@@ -22852,6 +20351,8 @@
                     </a:solidFill>
                   </a:tcPr>
                 </a:tc>
+              </a:tr>
+              <a:tr h="381000">
                 <a:tc>
                   <a:txBody>
                     <a:bodyPr vert="horz" wrap="square"/>
@@ -22898,8 +20399,6 @@
                     </a:solidFill>
                   </a:tcPr>
                 </a:tc>
-              </a:tr>
-              <a:tr h="381000">
                 <a:tc>
                   <a:txBody>
                     <a:bodyPr vert="horz" wrap="square"/>
@@ -22992,6 +20491,8 @@
                     </a:solidFill>
                   </a:tcPr>
                 </a:tc>
+              </a:tr>
+              <a:tr h="381000">
                 <a:tc>
                   <a:txBody>
                     <a:bodyPr vert="horz" wrap="square"/>
@@ -23061,8 +20562,6 @@
                     </a:solidFill>
                   </a:tcPr>
                 </a:tc>
-              </a:tr>
-              <a:tr h="381000">
                 <a:tc>
                   <a:txBody>
                     <a:bodyPr vert="horz" wrap="square"/>
@@ -23132,6 +20631,8 @@
                     </a:solidFill>
                   </a:tcPr>
                 </a:tc>
+              </a:tr>
+              <a:tr h="381000">
                 <a:tc>
                   <a:txBody>
                     <a:bodyPr vert="horz" wrap="square"/>
@@ -23224,8 +20725,6 @@
                     </a:solidFill>
                   </a:tcPr>
                 </a:tc>
-              </a:tr>
-              <a:tr h="381000">
                 <a:tc>
                   <a:txBody>
                     <a:bodyPr vert="horz" wrap="square"/>
@@ -23272,6 +20771,8 @@
                     </a:solidFill>
                   </a:tcPr>
                 </a:tc>
+              </a:tr>
+              <a:tr h="381000">
                 <a:tc>
                   <a:txBody>
                     <a:bodyPr vert="horz" wrap="square"/>
@@ -23387,8 +20888,6 @@
                     </a:solidFill>
                   </a:tcPr>
                 </a:tc>
-              </a:tr>
-              <a:tr h="381000">
                 <a:tc>
                   <a:txBody>
                     <a:bodyPr vert="horz" wrap="square"/>
@@ -23412,6 +20911,8 @@
                     </a:solidFill>
                   </a:tcPr>
                 </a:tc>
+              </a:tr>
+              <a:tr h="381000">
                 <a:tc>
                   <a:txBody>
                     <a:bodyPr vert="horz" wrap="square"/>
@@ -23552,192 +21053,6 @@
                 </a:tc>
               </a:tr>
               <a:tr h="381000">
-                <a:tc>
-                  <a:txBody>
-                    <a:bodyPr vert="horz" wrap="square"/>
-                    <a:lstStyle/>
-                    <a:p>
-                      <a:pPr>
-                        <a:buNone/>
-                      </a:pPr>
-                      <a:endParaRPr lang="en-GB" sz="1200" b="0">
-                        <a:solidFill>
-                          <a:schemeClr val="bg1"/>
-                        </a:solidFill>
-                      </a:endParaRPr>
-                    </a:p>
-                  </a:txBody>
-                  <a:tcPr>
-                    <a:solidFill>
-                      <a:schemeClr val="bg1">
-                        <a:lumMod val="50000"/>
-                      </a:schemeClr>
-                    </a:solidFill>
-                  </a:tcPr>
-                </a:tc>
-                <a:tc>
-                  <a:txBody>
-                    <a:bodyPr vert="horz" wrap="square"/>
-                    <a:lstStyle/>
-                    <a:p>
-                      <a:pPr>
-                        <a:buNone/>
-                      </a:pPr>
-                      <a:endParaRPr lang="en-GB" sz="1200" b="0">
-                        <a:solidFill>
-                          <a:schemeClr val="bg1"/>
-                        </a:solidFill>
-                      </a:endParaRPr>
-                    </a:p>
-                  </a:txBody>
-                  <a:tcPr>
-                    <a:solidFill>
-                      <a:schemeClr val="bg1">
-                        <a:lumMod val="50000"/>
-                      </a:schemeClr>
-                    </a:solidFill>
-                  </a:tcPr>
-                </a:tc>
-                <a:tc>
-                  <a:txBody>
-                    <a:bodyPr vert="horz" wrap="square"/>
-                    <a:lstStyle/>
-                    <a:p>
-                      <a:pPr>
-                        <a:buNone/>
-                      </a:pPr>
-                      <a:endParaRPr lang="en-GB" sz="1200" b="0">
-                        <a:solidFill>
-                          <a:schemeClr val="bg1"/>
-                        </a:solidFill>
-                      </a:endParaRPr>
-                    </a:p>
-                  </a:txBody>
-                  <a:tcPr>
-                    <a:solidFill>
-                      <a:schemeClr val="bg1">
-                        <a:lumMod val="50000"/>
-                      </a:schemeClr>
-                    </a:solidFill>
-                  </a:tcPr>
-                </a:tc>
-                <a:tc>
-                  <a:txBody>
-                    <a:bodyPr vert="horz" wrap="square"/>
-                    <a:lstStyle/>
-                    <a:p>
-                      <a:pPr>
-                        <a:buNone/>
-                      </a:pPr>
-                      <a:endParaRPr lang="en-GB" sz="1200" b="0">
-                        <a:solidFill>
-                          <a:schemeClr val="bg1"/>
-                        </a:solidFill>
-                      </a:endParaRPr>
-                    </a:p>
-                  </a:txBody>
-                  <a:tcPr>
-                    <a:solidFill>
-                      <a:schemeClr val="bg1">
-                        <a:lumMod val="50000"/>
-                      </a:schemeClr>
-                    </a:solidFill>
-                  </a:tcPr>
-                </a:tc>
-                <a:tc>
-                  <a:txBody>
-                    <a:bodyPr vert="horz" wrap="square"/>
-                    <a:lstStyle/>
-                    <a:p>
-                      <a:pPr>
-                        <a:buNone/>
-                      </a:pPr>
-                      <a:endParaRPr lang="en-GB" sz="1200" b="0">
-                        <a:solidFill>
-                          <a:schemeClr val="bg1"/>
-                        </a:solidFill>
-                      </a:endParaRPr>
-                    </a:p>
-                  </a:txBody>
-                  <a:tcPr>
-                    <a:solidFill>
-                      <a:schemeClr val="bg1">
-                        <a:lumMod val="50000"/>
-                      </a:schemeClr>
-                    </a:solidFill>
-                  </a:tcPr>
-                </a:tc>
-                <a:tc>
-                  <a:txBody>
-                    <a:bodyPr vert="horz" wrap="square"/>
-                    <a:lstStyle/>
-                    <a:p>
-                      <a:pPr>
-                        <a:buNone/>
-                      </a:pPr>
-                      <a:endParaRPr lang="en-GB" sz="1200" b="0">
-                        <a:solidFill>
-                          <a:schemeClr val="bg1"/>
-                        </a:solidFill>
-                      </a:endParaRPr>
-                    </a:p>
-                  </a:txBody>
-                  <a:tcPr>
-                    <a:solidFill>
-                      <a:schemeClr val="bg1">
-                        <a:lumMod val="50000"/>
-                      </a:schemeClr>
-                    </a:solidFill>
-                  </a:tcPr>
-                </a:tc>
-                <a:tc>
-                  <a:txBody>
-                    <a:bodyPr vert="horz" wrap="square"/>
-                    <a:lstStyle/>
-                    <a:p>
-                      <a:pPr>
-                        <a:buNone/>
-                      </a:pPr>
-                      <a:endParaRPr lang="en-GB" sz="1200" b="0">
-                        <a:solidFill>
-                          <a:schemeClr val="bg1"/>
-                        </a:solidFill>
-                      </a:endParaRPr>
-                    </a:p>
-                  </a:txBody>
-                  <a:tcPr>
-                    <a:solidFill>
-                      <a:schemeClr val="bg1">
-                        <a:lumMod val="50000"/>
-                      </a:schemeClr>
-                    </a:solidFill>
-                  </a:tcPr>
-                </a:tc>
-              </a:tr>
-              <a:tr h="381000">
-                <a:tc>
-                  <a:txBody>
-                    <a:bodyPr vert="horz" wrap="square"/>
-                    <a:lstStyle/>
-                    <a:p>
-                      <a:pPr>
-                        <a:buNone/>
-                      </a:pPr>
-                      <a:endParaRPr lang="en-GB" sz="1200" b="0">
-                        <a:solidFill>
-                          <a:schemeClr val="bg1"/>
-                        </a:solidFill>
-                      </a:endParaRPr>
-                    </a:p>
-                  </a:txBody>
-                  <a:tcPr>
-                    <a:solidFill>
-                      <a:schemeClr val="bg1">
-                        <a:lumMod val="50000"/>
-                      </a:schemeClr>
-                    </a:solidFill>
-                  </a:tcPr>
-                </a:tc>
                 <a:tc>
                   <a:txBody>
                     <a:bodyPr vert="horz" wrap="square"/>

</xml_diff>

<commit_message>
created TableGeneratorExcel to output tables
</commit_message>
<xml_diff>
--- a/Outputs/Customers.pptx
+++ b/Outputs/Customers.pptx
@@ -1,6 +1,6 @@
 
 <file path=ppt/presentation.xml><?xml version="1.0" encoding="utf-8"?>
-<!--Generated by Aspose.Slides for .NET 18.8-->
+<!--Generated by Aspose.Slides for .NET 18.10-->
 <p:presentation xmlns:r="http://schemas.openxmlformats.org/officeDocument/2006/relationships" xmlns:a="http://schemas.openxmlformats.org/drawingml/2006/main" xmlns:p="http://schemas.openxmlformats.org/presentationml/2006/main" saveSubsetFonts="1">
   <p:sldMasterIdLst>
     <p:sldMasterId id="2147483648" r:id="rId1"/>
@@ -120,7 +120,7 @@
 </file>
 
 <file path=ppt/slideLayouts/slideLayout1.xml><?xml version="1.0" encoding="utf-8"?>
-<p:sldLayout xmlns:a="http://schemas.openxmlformats.org/drawingml/2006/main" xmlns:r="http://schemas.openxmlformats.org/officeDocument/2006/relationships" xmlns:p14="http://schemas.microsoft.com/office/powerpoint/2010/main" xmlns:p15="http://schemas.microsoft.com/office/powerpoint/2012/main" xmlns:p="http://schemas.openxmlformats.org/presentationml/2006/main" type="title" preserve="1">
+<p:sldLayout xmlns:a="http://schemas.openxmlformats.org/drawingml/2006/main" xmlns:r="http://schemas.openxmlformats.org/officeDocument/2006/relationships" xmlns:p14="http://schemas.microsoft.com/office/powerpoint/2010/main" xmlns:a14="http://schemas.microsoft.com/office/drawing/2010/main" xmlns:p15="http://schemas.microsoft.com/office/powerpoint/2012/main" xmlns:p="http://schemas.openxmlformats.org/presentationml/2006/main" type="title" preserve="1">
   <p:cSld name="Title Slide">
     <p:spTree>
       <p:nvGrpSpPr>
@@ -357,7 +357,7 @@
 </file>
 
 <file path=ppt/slideLayouts/slideLayout10.xml><?xml version="1.0" encoding="utf-8"?>
-<p:sldLayout xmlns:a="http://schemas.openxmlformats.org/drawingml/2006/main" xmlns:r="http://schemas.openxmlformats.org/officeDocument/2006/relationships" xmlns:p14="http://schemas.microsoft.com/office/powerpoint/2010/main" xmlns:p15="http://schemas.microsoft.com/office/powerpoint/2012/main" xmlns:p="http://schemas.openxmlformats.org/presentationml/2006/main" type="vertTx" preserve="1">
+<p:sldLayout xmlns:a="http://schemas.openxmlformats.org/drawingml/2006/main" xmlns:r="http://schemas.openxmlformats.org/officeDocument/2006/relationships" xmlns:p14="http://schemas.microsoft.com/office/powerpoint/2010/main" xmlns:a14="http://schemas.microsoft.com/office/drawing/2010/main" xmlns:p15="http://schemas.microsoft.com/office/powerpoint/2012/main" xmlns:p="http://schemas.openxmlformats.org/presentationml/2006/main" type="vertTx" preserve="1">
   <p:cSld name="Title and Vertical Text">
     <p:spTree>
       <p:nvGrpSpPr>
@@ -526,7 +526,7 @@
 </file>
 
 <file path=ppt/slideLayouts/slideLayout11.xml><?xml version="1.0" encoding="utf-8"?>
-<p:sldLayout xmlns:a="http://schemas.openxmlformats.org/drawingml/2006/main" xmlns:r="http://schemas.openxmlformats.org/officeDocument/2006/relationships" xmlns:p14="http://schemas.microsoft.com/office/powerpoint/2010/main" xmlns:p15="http://schemas.microsoft.com/office/powerpoint/2012/main" xmlns:p="http://schemas.openxmlformats.org/presentationml/2006/main" type="vertTitleAndTx" preserve="1">
+<p:sldLayout xmlns:a="http://schemas.openxmlformats.org/drawingml/2006/main" xmlns:r="http://schemas.openxmlformats.org/officeDocument/2006/relationships" xmlns:p14="http://schemas.microsoft.com/office/powerpoint/2010/main" xmlns:a14="http://schemas.microsoft.com/office/drawing/2010/main" xmlns:p15="http://schemas.microsoft.com/office/powerpoint/2012/main" xmlns:p="http://schemas.openxmlformats.org/presentationml/2006/main" type="vertTitleAndTx" preserve="1">
   <p:cSld name="Vertical Title and Text">
     <p:spTree>
       <p:nvGrpSpPr>
@@ -705,7 +705,7 @@
 </file>
 
 <file path=ppt/slideLayouts/slideLayout2.xml><?xml version="1.0" encoding="utf-8"?>
-<p:sldLayout xmlns:a="http://schemas.openxmlformats.org/drawingml/2006/main" xmlns:r="http://schemas.openxmlformats.org/officeDocument/2006/relationships" xmlns:p14="http://schemas.microsoft.com/office/powerpoint/2010/main" xmlns:p15="http://schemas.microsoft.com/office/powerpoint/2012/main" xmlns:p="http://schemas.openxmlformats.org/presentationml/2006/main" type="obj" preserve="1">
+<p:sldLayout xmlns:a="http://schemas.openxmlformats.org/drawingml/2006/main" xmlns:r="http://schemas.openxmlformats.org/officeDocument/2006/relationships" xmlns:p14="http://schemas.microsoft.com/office/powerpoint/2010/main" xmlns:a14="http://schemas.microsoft.com/office/drawing/2010/main" xmlns:p15="http://schemas.microsoft.com/office/powerpoint/2012/main" xmlns:p="http://schemas.openxmlformats.org/presentationml/2006/main" type="obj" preserve="1">
   <p:cSld name="Title and Content">
     <p:spTree>
       <p:nvGrpSpPr>
@@ -874,7 +874,7 @@
 </file>
 
 <file path=ppt/slideLayouts/slideLayout3.xml><?xml version="1.0" encoding="utf-8"?>
-<p:sldLayout xmlns:a="http://schemas.openxmlformats.org/drawingml/2006/main" xmlns:r="http://schemas.openxmlformats.org/officeDocument/2006/relationships" xmlns:p14="http://schemas.microsoft.com/office/powerpoint/2010/main" xmlns:p15="http://schemas.microsoft.com/office/powerpoint/2012/main" xmlns:p="http://schemas.openxmlformats.org/presentationml/2006/main" type="secHead" preserve="1">
+<p:sldLayout xmlns:a="http://schemas.openxmlformats.org/drawingml/2006/main" xmlns:r="http://schemas.openxmlformats.org/officeDocument/2006/relationships" xmlns:p14="http://schemas.microsoft.com/office/powerpoint/2010/main" xmlns:a14="http://schemas.microsoft.com/office/drawing/2010/main" xmlns:p15="http://schemas.microsoft.com/office/powerpoint/2012/main" xmlns:p="http://schemas.openxmlformats.org/presentationml/2006/main" type="secHead" preserve="1">
   <p:cSld name="Section Header">
     <p:spTree>
       <p:nvGrpSpPr>
@@ -1115,7 +1115,7 @@
 </file>
 
 <file path=ppt/slideLayouts/slideLayout4.xml><?xml version="1.0" encoding="utf-8"?>
-<p:sldLayout xmlns:a="http://schemas.openxmlformats.org/drawingml/2006/main" xmlns:r="http://schemas.openxmlformats.org/officeDocument/2006/relationships" xmlns:p14="http://schemas.microsoft.com/office/powerpoint/2010/main" xmlns:p15="http://schemas.microsoft.com/office/powerpoint/2012/main" xmlns:p="http://schemas.openxmlformats.org/presentationml/2006/main" type="twoObj" preserve="1">
+<p:sldLayout xmlns:a="http://schemas.openxmlformats.org/drawingml/2006/main" xmlns:r="http://schemas.openxmlformats.org/officeDocument/2006/relationships" xmlns:p14="http://schemas.microsoft.com/office/powerpoint/2010/main" xmlns:a14="http://schemas.microsoft.com/office/drawing/2010/main" xmlns:p15="http://schemas.microsoft.com/office/powerpoint/2012/main" xmlns:p="http://schemas.openxmlformats.org/presentationml/2006/main" type="twoObj" preserve="1">
   <p:cSld name="Two Content">
     <p:spTree>
       <p:nvGrpSpPr>
@@ -1406,7 +1406,7 @@
 </file>
 
 <file path=ppt/slideLayouts/slideLayout5.xml><?xml version="1.0" encoding="utf-8"?>
-<p:sldLayout xmlns:a="http://schemas.openxmlformats.org/drawingml/2006/main" xmlns:r="http://schemas.openxmlformats.org/officeDocument/2006/relationships" xmlns:p14="http://schemas.microsoft.com/office/powerpoint/2010/main" xmlns:p15="http://schemas.microsoft.com/office/powerpoint/2012/main" xmlns:p="http://schemas.openxmlformats.org/presentationml/2006/main" type="twoTxTwoObj" preserve="1">
+<p:sldLayout xmlns:a="http://schemas.openxmlformats.org/drawingml/2006/main" xmlns:r="http://schemas.openxmlformats.org/officeDocument/2006/relationships" xmlns:p14="http://schemas.microsoft.com/office/powerpoint/2010/main" xmlns:a14="http://schemas.microsoft.com/office/drawing/2010/main" xmlns:p15="http://schemas.microsoft.com/office/powerpoint/2012/main" xmlns:p="http://schemas.openxmlformats.org/presentationml/2006/main" type="twoTxTwoObj" preserve="1">
   <p:cSld name="Comparison">
     <p:spTree>
       <p:nvGrpSpPr>
@@ -1827,7 +1827,7 @@
 </file>
 
 <file path=ppt/slideLayouts/slideLayout6.xml><?xml version="1.0" encoding="utf-8"?>
-<p:sldLayout xmlns:a="http://schemas.openxmlformats.org/drawingml/2006/main" xmlns:r="http://schemas.openxmlformats.org/officeDocument/2006/relationships" xmlns:p14="http://schemas.microsoft.com/office/powerpoint/2010/main" xmlns:p15="http://schemas.microsoft.com/office/powerpoint/2012/main" xmlns:p="http://schemas.openxmlformats.org/presentationml/2006/main" type="titleOnly" preserve="1">
+<p:sldLayout xmlns:a="http://schemas.openxmlformats.org/drawingml/2006/main" xmlns:r="http://schemas.openxmlformats.org/officeDocument/2006/relationships" xmlns:p14="http://schemas.microsoft.com/office/powerpoint/2010/main" xmlns:a14="http://schemas.microsoft.com/office/drawing/2010/main" xmlns:p15="http://schemas.microsoft.com/office/powerpoint/2012/main" xmlns:p="http://schemas.openxmlformats.org/presentationml/2006/main" type="titleOnly" preserve="1">
   <p:cSld name="Title Only">
     <p:spTree>
       <p:nvGrpSpPr>
@@ -1940,7 +1940,7 @@
 </file>
 
 <file path=ppt/slideLayouts/slideLayout7.xml><?xml version="1.0" encoding="utf-8"?>
-<p:sldLayout xmlns:a="http://schemas.openxmlformats.org/drawingml/2006/main" xmlns:r="http://schemas.openxmlformats.org/officeDocument/2006/relationships" xmlns:p14="http://schemas.microsoft.com/office/powerpoint/2010/main" xmlns:p15="http://schemas.microsoft.com/office/powerpoint/2012/main" xmlns:p="http://schemas.openxmlformats.org/presentationml/2006/main" type="blank" preserve="1">
+<p:sldLayout xmlns:a="http://schemas.openxmlformats.org/drawingml/2006/main" xmlns:r="http://schemas.openxmlformats.org/officeDocument/2006/relationships" xmlns:p14="http://schemas.microsoft.com/office/powerpoint/2010/main" xmlns:a14="http://schemas.microsoft.com/office/drawing/2010/main" xmlns:p15="http://schemas.microsoft.com/office/powerpoint/2012/main" xmlns:p="http://schemas.openxmlformats.org/presentationml/2006/main" type="blank" preserve="1">
   <p:cSld name="Blank">
     <p:spTree>
       <p:nvGrpSpPr>
@@ -2030,7 +2030,7 @@
 </file>
 
 <file path=ppt/slideLayouts/slideLayout8.xml><?xml version="1.0" encoding="utf-8"?>
-<p:sldLayout xmlns:a="http://schemas.openxmlformats.org/drawingml/2006/main" xmlns:r="http://schemas.openxmlformats.org/officeDocument/2006/relationships" xmlns:p14="http://schemas.microsoft.com/office/powerpoint/2010/main" xmlns:p15="http://schemas.microsoft.com/office/powerpoint/2012/main" xmlns:p="http://schemas.openxmlformats.org/presentationml/2006/main" type="objTx" preserve="1">
+<p:sldLayout xmlns:a="http://schemas.openxmlformats.org/drawingml/2006/main" xmlns:r="http://schemas.openxmlformats.org/officeDocument/2006/relationships" xmlns:p14="http://schemas.microsoft.com/office/powerpoint/2010/main" xmlns:a14="http://schemas.microsoft.com/office/drawing/2010/main" xmlns:p15="http://schemas.microsoft.com/office/powerpoint/2012/main" xmlns:p="http://schemas.openxmlformats.org/presentationml/2006/main" type="objTx" preserve="1">
   <p:cSld name="Content with Caption">
     <p:spTree>
       <p:nvGrpSpPr>
@@ -2306,7 +2306,7 @@
 </file>
 
 <file path=ppt/slideLayouts/slideLayout9.xml><?xml version="1.0" encoding="utf-8"?>
-<p:sldLayout xmlns:a="http://schemas.openxmlformats.org/drawingml/2006/main" xmlns:r="http://schemas.openxmlformats.org/officeDocument/2006/relationships" xmlns:p14="http://schemas.microsoft.com/office/powerpoint/2010/main" xmlns:p15="http://schemas.microsoft.com/office/powerpoint/2012/main" xmlns:p="http://schemas.openxmlformats.org/presentationml/2006/main" type="picTx" preserve="1">
+<p:sldLayout xmlns:a="http://schemas.openxmlformats.org/drawingml/2006/main" xmlns:r="http://schemas.openxmlformats.org/officeDocument/2006/relationships" xmlns:p14="http://schemas.microsoft.com/office/powerpoint/2010/main" xmlns:a14="http://schemas.microsoft.com/office/drawing/2010/main" xmlns:p15="http://schemas.microsoft.com/office/powerpoint/2012/main" xmlns:p="http://schemas.openxmlformats.org/presentationml/2006/main" type="picTx" preserve="1">
   <p:cSld name="Picture with Caption">
     <p:spTree>
       <p:nvGrpSpPr>
@@ -2554,7 +2554,7 @@
 </file>
 
 <file path=ppt/slideMasters/slideMaster1.xml><?xml version="1.0" encoding="utf-8"?>
-<p:sldMaster xmlns:a="http://schemas.openxmlformats.org/drawingml/2006/main" xmlns:r="http://schemas.openxmlformats.org/officeDocument/2006/relationships" xmlns:p14="http://schemas.microsoft.com/office/powerpoint/2010/main" xmlns:p15="http://schemas.microsoft.com/office/powerpoint/2012/main" xmlns:p="http://schemas.openxmlformats.org/presentationml/2006/main">
+<p:sldMaster xmlns:a="http://schemas.openxmlformats.org/drawingml/2006/main" xmlns:r="http://schemas.openxmlformats.org/officeDocument/2006/relationships" xmlns:p14="http://schemas.microsoft.com/office/powerpoint/2010/main" xmlns:a14="http://schemas.microsoft.com/office/drawing/2010/main" xmlns:p15="http://schemas.microsoft.com/office/powerpoint/2012/main" xmlns:p="http://schemas.openxmlformats.org/presentationml/2006/main">
   <p:cSld>
     <p:bg>
       <p:bgRef idx="1001">
@@ -3063,7 +3063,7 @@
 </file>
 
 <file path=ppt/slides/slide1.xml><?xml version="1.0" encoding="utf-8"?>
-<p:sld xmlns:a="http://schemas.openxmlformats.org/drawingml/2006/main" xmlns:r="http://schemas.openxmlformats.org/officeDocument/2006/relationships" xmlns:p14="http://schemas.microsoft.com/office/powerpoint/2010/main" xmlns:p15="http://schemas.microsoft.com/office/powerpoint/2012/main" xmlns:p="http://schemas.openxmlformats.org/presentationml/2006/main">
+<p:sld xmlns:a="http://schemas.openxmlformats.org/drawingml/2006/main" xmlns:r="http://schemas.openxmlformats.org/officeDocument/2006/relationships" xmlns:p14="http://schemas.microsoft.com/office/powerpoint/2010/main" xmlns:a14="http://schemas.microsoft.com/office/drawing/2010/main" xmlns:p15="http://schemas.microsoft.com/office/powerpoint/2012/main" xmlns:p="http://schemas.openxmlformats.org/presentationml/2006/main">
   <p:cSld>
     <p:bg>
       <p:bgPr>
@@ -5029,7 +5029,7 @@
           <a:p>
             <a:pPr algn="ctr"/>
             <a:r>
-              <a:t>Created with Aspose.Slides for .NET Standard 2.0 18.8.</a:t>
+              <a:t>Created with Aspose.Slides for .NET Standard 2.0 18.10.</a:t>
             </a:r>
           </a:p>
           <a:p>
@@ -5051,7 +5051,7 @@
 </file>
 
 <file path=ppt/slides/slide2.xml><?xml version="1.0" encoding="utf-8"?>
-<p:sld xmlns:a="http://schemas.openxmlformats.org/drawingml/2006/main" xmlns:r="http://schemas.openxmlformats.org/officeDocument/2006/relationships" xmlns:p14="http://schemas.microsoft.com/office/powerpoint/2010/main" xmlns:p15="http://schemas.microsoft.com/office/powerpoint/2012/main" xmlns:p="http://schemas.openxmlformats.org/presentationml/2006/main">
+<p:sld xmlns:a="http://schemas.openxmlformats.org/drawingml/2006/main" xmlns:r="http://schemas.openxmlformats.org/officeDocument/2006/relationships" xmlns:p14="http://schemas.microsoft.com/office/powerpoint/2010/main" xmlns:a14="http://schemas.microsoft.com/office/drawing/2010/main" xmlns:p15="http://schemas.microsoft.com/office/powerpoint/2012/main" xmlns:p="http://schemas.openxmlformats.org/presentationml/2006/main">
   <p:cSld>
     <p:bg>
       <p:bgPr>
@@ -7005,7 +7005,7 @@
           <a:p>
             <a:pPr algn="ctr"/>
             <a:r>
-              <a:t>Created with Aspose.Slides for .NET Standard 2.0 18.8.</a:t>
+              <a:t>Created with Aspose.Slides for .NET Standard 2.0 18.10.</a:t>
             </a:r>
           </a:p>
           <a:p>
@@ -7076,7 +7076,7 @@
           <a:p>
             <a:pPr algn="ctr"/>
             <a:r>
-              <a:t>Created with Aspose.Slides for .NET Standard 2.0 18.8.</a:t>
+              <a:t>Created with Aspose.Slides for .NET Standard 2.0 18.10.</a:t>
             </a:r>
           </a:p>
           <a:p>
@@ -7098,7 +7098,7 @@
 </file>
 
 <file path=ppt/slides/slide3.xml><?xml version="1.0" encoding="utf-8"?>
-<p:sld xmlns:a="http://schemas.openxmlformats.org/drawingml/2006/main" xmlns:r="http://schemas.openxmlformats.org/officeDocument/2006/relationships" xmlns:p14="http://schemas.microsoft.com/office/powerpoint/2010/main" xmlns:p15="http://schemas.microsoft.com/office/powerpoint/2012/main" xmlns:p="http://schemas.openxmlformats.org/presentationml/2006/main">
+<p:sld xmlns:a="http://schemas.openxmlformats.org/drawingml/2006/main" xmlns:r="http://schemas.openxmlformats.org/officeDocument/2006/relationships" xmlns:p14="http://schemas.microsoft.com/office/powerpoint/2010/main" xmlns:a14="http://schemas.microsoft.com/office/drawing/2010/main" xmlns:p15="http://schemas.microsoft.com/office/powerpoint/2012/main" xmlns:p="http://schemas.openxmlformats.org/presentationml/2006/main">
   <p:cSld>
     <p:bg>
       <p:bgPr>
@@ -9064,7 +9064,7 @@
           <a:p>
             <a:pPr algn="ctr"/>
             <a:r>
-              <a:t>Created with Aspose.Slides for .NET Standard 2.0 18.8.</a:t>
+              <a:t>Created with Aspose.Slides for .NET Standard 2.0 18.10.</a:t>
             </a:r>
           </a:p>
           <a:p>
@@ -9135,7 +9135,7 @@
           <a:p>
             <a:pPr algn="ctr"/>
             <a:r>
-              <a:t>Created with Aspose.Slides for .NET Standard 2.0 18.8.</a:t>
+              <a:t>Created with Aspose.Slides for .NET Standard 2.0 18.10.</a:t>
             </a:r>
           </a:p>
           <a:p>
@@ -9157,7 +9157,7 @@
 </file>
 
 <file path=ppt/slides/slide4.xml><?xml version="1.0" encoding="utf-8"?>
-<p:sld xmlns:a="http://schemas.openxmlformats.org/drawingml/2006/main" xmlns:r="http://schemas.openxmlformats.org/officeDocument/2006/relationships" xmlns:p14="http://schemas.microsoft.com/office/powerpoint/2010/main" xmlns:p15="http://schemas.microsoft.com/office/powerpoint/2012/main" xmlns:p="http://schemas.openxmlformats.org/presentationml/2006/main">
+<p:sld xmlns:a="http://schemas.openxmlformats.org/drawingml/2006/main" xmlns:r="http://schemas.openxmlformats.org/officeDocument/2006/relationships" xmlns:p14="http://schemas.microsoft.com/office/powerpoint/2010/main" xmlns:a14="http://schemas.microsoft.com/office/drawing/2010/main" xmlns:p15="http://schemas.microsoft.com/office/powerpoint/2012/main" xmlns:p="http://schemas.openxmlformats.org/presentationml/2006/main">
   <p:cSld>
     <p:bg>
       <p:bgPr>
@@ -11111,7 +11111,7 @@
           <a:p>
             <a:pPr algn="ctr"/>
             <a:r>
-              <a:t>Created with Aspose.Slides for .NET Standard 2.0 18.8.</a:t>
+              <a:t>Created with Aspose.Slides for .NET Standard 2.0 18.10.</a:t>
             </a:r>
           </a:p>
           <a:p>
@@ -11182,7 +11182,7 @@
           <a:p>
             <a:pPr algn="ctr"/>
             <a:r>
-              <a:t>Created with Aspose.Slides for .NET Standard 2.0 18.8.</a:t>
+              <a:t>Created with Aspose.Slides for .NET Standard 2.0 18.10.</a:t>
             </a:r>
           </a:p>
           <a:p>
@@ -11204,7 +11204,7 @@
 </file>
 
 <file path=ppt/slides/slide5.xml><?xml version="1.0" encoding="utf-8"?>
-<p:sld xmlns:a="http://schemas.openxmlformats.org/drawingml/2006/main" xmlns:r="http://schemas.openxmlformats.org/officeDocument/2006/relationships" xmlns:p14="http://schemas.microsoft.com/office/powerpoint/2010/main" xmlns:p15="http://schemas.microsoft.com/office/powerpoint/2012/main" xmlns:p="http://schemas.openxmlformats.org/presentationml/2006/main">
+<p:sld xmlns:a="http://schemas.openxmlformats.org/drawingml/2006/main" xmlns:r="http://schemas.openxmlformats.org/officeDocument/2006/relationships" xmlns:p14="http://schemas.microsoft.com/office/powerpoint/2010/main" xmlns:a14="http://schemas.microsoft.com/office/drawing/2010/main" xmlns:p15="http://schemas.microsoft.com/office/powerpoint/2012/main" xmlns:p="http://schemas.openxmlformats.org/presentationml/2006/main">
   <p:cSld>
     <p:bg>
       <p:bgPr>
@@ -13170,7 +13170,7 @@
           <a:p>
             <a:pPr algn="ctr"/>
             <a:r>
-              <a:t>Created with Aspose.Slides for .NET Standard 2.0 18.8.</a:t>
+              <a:t>Created with Aspose.Slides for .NET Standard 2.0 18.10.</a:t>
             </a:r>
           </a:p>
           <a:p>
@@ -13241,7 +13241,7 @@
           <a:p>
             <a:pPr algn="ctr"/>
             <a:r>
-              <a:t>Created with Aspose.Slides for .NET Standard 2.0 18.8.</a:t>
+              <a:t>Created with Aspose.Slides for .NET Standard 2.0 18.10.</a:t>
             </a:r>
           </a:p>
           <a:p>
@@ -13263,7 +13263,7 @@
 </file>
 
 <file path=ppt/slides/slide6.xml><?xml version="1.0" encoding="utf-8"?>
-<p:sld xmlns:a="http://schemas.openxmlformats.org/drawingml/2006/main" xmlns:r="http://schemas.openxmlformats.org/officeDocument/2006/relationships" xmlns:p14="http://schemas.microsoft.com/office/powerpoint/2010/main" xmlns:p15="http://schemas.microsoft.com/office/powerpoint/2012/main" xmlns:p="http://schemas.openxmlformats.org/presentationml/2006/main">
+<p:sld xmlns:a="http://schemas.openxmlformats.org/drawingml/2006/main" xmlns:r="http://schemas.openxmlformats.org/officeDocument/2006/relationships" xmlns:p14="http://schemas.microsoft.com/office/powerpoint/2010/main" xmlns:a14="http://schemas.microsoft.com/office/drawing/2010/main" xmlns:p15="http://schemas.microsoft.com/office/powerpoint/2012/main" xmlns:p="http://schemas.openxmlformats.org/presentationml/2006/main">
   <p:cSld>
     <p:bg>
       <p:bgPr>
@@ -15217,7 +15217,7 @@
           <a:p>
             <a:pPr algn="ctr"/>
             <a:r>
-              <a:t>Created with Aspose.Slides for .NET Standard 2.0 18.8.</a:t>
+              <a:t>Created with Aspose.Slides for .NET Standard 2.0 18.10.</a:t>
             </a:r>
           </a:p>
           <a:p>
@@ -15288,7 +15288,7 @@
           <a:p>
             <a:pPr algn="ctr"/>
             <a:r>
-              <a:t>Created with Aspose.Slides for .NET Standard 2.0 18.8.</a:t>
+              <a:t>Created with Aspose.Slides for .NET Standard 2.0 18.10.</a:t>
             </a:r>
           </a:p>
           <a:p>
@@ -15310,7 +15310,7 @@
 </file>
 
 <file path=ppt/slides/slide7.xml><?xml version="1.0" encoding="utf-8"?>
-<p:sld xmlns:a="http://schemas.openxmlformats.org/drawingml/2006/main" xmlns:r="http://schemas.openxmlformats.org/officeDocument/2006/relationships" xmlns:p14="http://schemas.microsoft.com/office/powerpoint/2010/main" xmlns:p15="http://schemas.microsoft.com/office/powerpoint/2012/main" xmlns:p="http://schemas.openxmlformats.org/presentationml/2006/main">
+<p:sld xmlns:a="http://schemas.openxmlformats.org/drawingml/2006/main" xmlns:r="http://schemas.openxmlformats.org/officeDocument/2006/relationships" xmlns:p14="http://schemas.microsoft.com/office/powerpoint/2010/main" xmlns:a14="http://schemas.microsoft.com/office/drawing/2010/main" xmlns:p15="http://schemas.microsoft.com/office/powerpoint/2012/main" xmlns:p="http://schemas.openxmlformats.org/presentationml/2006/main">
   <p:cSld>
     <p:bg>
       <p:bgPr>
@@ -17276,7 +17276,7 @@
           <a:p>
             <a:pPr algn="ctr"/>
             <a:r>
-              <a:t>Created with Aspose.Slides for .NET Standard 2.0 18.8.</a:t>
+              <a:t>Created with Aspose.Slides for .NET Standard 2.0 18.10.</a:t>
             </a:r>
           </a:p>
           <a:p>
@@ -17347,7 +17347,7 @@
           <a:p>
             <a:pPr algn="ctr"/>
             <a:r>
-              <a:t>Created with Aspose.Slides for .NET Standard 2.0 18.8.</a:t>
+              <a:t>Created with Aspose.Slides for .NET Standard 2.0 18.10.</a:t>
             </a:r>
           </a:p>
           <a:p>
@@ -17369,7 +17369,7 @@
 </file>
 
 <file path=ppt/slides/slide8.xml><?xml version="1.0" encoding="utf-8"?>
-<p:sld xmlns:a="http://schemas.openxmlformats.org/drawingml/2006/main" xmlns:r="http://schemas.openxmlformats.org/officeDocument/2006/relationships" xmlns:p14="http://schemas.microsoft.com/office/powerpoint/2010/main" xmlns:p15="http://schemas.microsoft.com/office/powerpoint/2012/main" xmlns:p="http://schemas.openxmlformats.org/presentationml/2006/main">
+<p:sld xmlns:a="http://schemas.openxmlformats.org/drawingml/2006/main" xmlns:r="http://schemas.openxmlformats.org/officeDocument/2006/relationships" xmlns:p14="http://schemas.microsoft.com/office/powerpoint/2010/main" xmlns:a14="http://schemas.microsoft.com/office/drawing/2010/main" xmlns:p15="http://schemas.microsoft.com/office/powerpoint/2012/main" xmlns:p="http://schemas.openxmlformats.org/presentationml/2006/main">
   <p:cSld>
     <p:bg>
       <p:bgPr>
@@ -19323,7 +19323,7 @@
           <a:p>
             <a:pPr algn="ctr"/>
             <a:r>
-              <a:t>Created with Aspose.Slides for .NET Standard 2.0 18.8.</a:t>
+              <a:t>Created with Aspose.Slides for .NET Standard 2.0 18.10.</a:t>
             </a:r>
           </a:p>
           <a:p>
@@ -19394,7 +19394,7 @@
           <a:p>
             <a:pPr algn="ctr"/>
             <a:r>
-              <a:t>Created with Aspose.Slides for .NET Standard 2.0 18.8.</a:t>
+              <a:t>Created with Aspose.Slides for .NET Standard 2.0 18.10.</a:t>
             </a:r>
           </a:p>
           <a:p>
@@ -19416,7 +19416,7 @@
 </file>
 
 <file path=ppt/slides/slide9.xml><?xml version="1.0" encoding="utf-8"?>
-<p:sld xmlns:a="http://schemas.openxmlformats.org/drawingml/2006/main" xmlns:r="http://schemas.openxmlformats.org/officeDocument/2006/relationships" xmlns:p14="http://schemas.microsoft.com/office/powerpoint/2010/main" xmlns:p15="http://schemas.microsoft.com/office/powerpoint/2012/main" xmlns:p="http://schemas.openxmlformats.org/presentationml/2006/main">
+<p:sld xmlns:a="http://schemas.openxmlformats.org/drawingml/2006/main" xmlns:r="http://schemas.openxmlformats.org/officeDocument/2006/relationships" xmlns:p14="http://schemas.microsoft.com/office/powerpoint/2010/main" xmlns:a14="http://schemas.microsoft.com/office/drawing/2010/main" xmlns:p15="http://schemas.microsoft.com/office/powerpoint/2012/main" xmlns:p="http://schemas.openxmlformats.org/presentationml/2006/main">
   <p:cSld>
     <p:bg>
       <p:bgPr>
@@ -21286,7 +21286,7 @@
           <a:p>
             <a:pPr algn="ctr"/>
             <a:r>
-              <a:t>Created with Aspose.Slides for .NET Standard 2.0 18.8.</a:t>
+              <a:t>Created with Aspose.Slides for .NET Standard 2.0 18.10.</a:t>
             </a:r>
           </a:p>
           <a:p>
@@ -21357,7 +21357,7 @@
           <a:p>
             <a:pPr algn="ctr"/>
             <a:r>
-              <a:t>Created with Aspose.Slides for .NET Standard 2.0 18.8.</a:t>
+              <a:t>Created with Aspose.Slides for .NET Standard 2.0 18.10.</a:t>
             </a:r>
           </a:p>
           <a:p>
@@ -21382,9 +21382,9 @@
 <p:tagLst xmlns:p="http://schemas.openxmlformats.org/presentationml/2006/main">
   <p:tag name="AS_NET" val="4.0.30319.42000"/>
   <p:tag name="AS_OS" val="Microsoft Windows NT 6.2.9200.0"/>
-  <p:tag name="AS_RELEASE_DATE" val="2018.08.10"/>
+  <p:tag name="AS_RELEASE_DATE" val="2018.10.10"/>
   <p:tag name="AS_TITLE" val="Aspose.Slides for .NET Standard 2.0"/>
-  <p:tag name="AS_VERSION" val="18.8"/>
+  <p:tag name="AS_VERSION" val="18.10"/>
 </p:tagLst>
 </file>
 

</xml_diff>